<commit_message>
Update figures, pet data, last analyses
</commit_message>
<xml_diff>
--- a/fig/fig1.pptx
+++ b/fig/fig1.pptx
@@ -2,12 +2,15 @@
 <file path=ppt/presentation.xml><?xml version="1.0" encoding="utf-8"?>
 <p:presentation xmlns:a="http://schemas.openxmlformats.org/drawingml/2006/main" xmlns:r="http://schemas.openxmlformats.org/officeDocument/2006/relationships" xmlns:p="http://schemas.openxmlformats.org/presentationml/2006/main" saveSubsetFonts="1" autoCompressPictures="0">
   <p:sldMasterIdLst>
-    <p:sldMasterId id="2147483696" r:id="rId1"/>
+    <p:sldMasterId id="2147483720" r:id="rId1"/>
   </p:sldMasterIdLst>
+  <p:notesMasterIdLst>
+    <p:notesMasterId r:id="rId3"/>
+  </p:notesMasterIdLst>
   <p:sldIdLst>
     <p:sldId id="256" r:id="rId2"/>
   </p:sldIdLst>
-  <p:sldSz cx="21959888" cy="11520488"/>
+  <p:sldSz cx="21959888" cy="12960350"/>
   <p:notesSz cx="6858000" cy="9144000"/>
   <p:defaultTextStyle>
     <a:defPPr>
@@ -107,7 +110,7 @@
   <p:extLst>
     <p:ext uri="{EFAFB233-063F-42B5-8137-9DF3F51BA10A}">
       <p15:sldGuideLst xmlns:p15="http://schemas.microsoft.com/office/powerpoint/2012/main">
-        <p15:guide id="1" orient="horz" pos="3629" userDrawn="1">
+        <p15:guide id="1" orient="horz" pos="4083" userDrawn="1">
           <p15:clr>
             <a:srgbClr val="A4A3A4"/>
           </p15:clr>
@@ -121,6 +124,440 @@
     </p:ext>
   </p:extLst>
 </p:presentation>
+</file>
+
+<file path=ppt/notesMasters/notesMaster1.xml><?xml version="1.0" encoding="utf-8"?>
+<p:notesMaster xmlns:a="http://schemas.openxmlformats.org/drawingml/2006/main" xmlns:r="http://schemas.openxmlformats.org/officeDocument/2006/relationships" xmlns:p="http://schemas.openxmlformats.org/presentationml/2006/main">
+  <p:cSld>
+    <p:bg>
+      <p:bgRef idx="1001">
+        <a:schemeClr val="bg1"/>
+      </p:bgRef>
+    </p:bg>
+    <p:spTree>
+      <p:nvGrpSpPr>
+        <p:cNvPr id="1" name=""/>
+        <p:cNvGrpSpPr/>
+        <p:nvPr/>
+      </p:nvGrpSpPr>
+      <p:grpSpPr>
+        <a:xfrm>
+          <a:off x="0" y="0"/>
+          <a:ext cx="0" cy="0"/>
+          <a:chOff x="0" y="0"/>
+          <a:chExt cx="0" cy="0"/>
+        </a:xfrm>
+      </p:grpSpPr>
+      <p:sp>
+        <p:nvSpPr>
+          <p:cNvPr id="2" name="Header Placeholder 1"/>
+          <p:cNvSpPr>
+            <a:spLocks noGrp="1"/>
+          </p:cNvSpPr>
+          <p:nvPr>
+            <p:ph type="hdr" sz="quarter"/>
+          </p:nvPr>
+        </p:nvSpPr>
+        <p:spPr>
+          <a:xfrm>
+            <a:off x="0" y="0"/>
+            <a:ext cx="2971800" cy="458788"/>
+          </a:xfrm>
+          <a:prstGeom prst="rect">
+            <a:avLst/>
+          </a:prstGeom>
+        </p:spPr>
+        <p:txBody>
+          <a:bodyPr vert="horz" lIns="91440" tIns="45720" rIns="91440" bIns="45720" rtlCol="0"/>
+          <a:lstStyle>
+            <a:lvl1pPr algn="l">
+              <a:defRPr sz="1200"/>
+            </a:lvl1pPr>
+          </a:lstStyle>
+          <a:p>
+            <a:endParaRPr lang="en-DE"/>
+          </a:p>
+        </p:txBody>
+      </p:sp>
+      <p:sp>
+        <p:nvSpPr>
+          <p:cNvPr id="3" name="Date Placeholder 2"/>
+          <p:cNvSpPr>
+            <a:spLocks noGrp="1"/>
+          </p:cNvSpPr>
+          <p:nvPr>
+            <p:ph type="dt" idx="1"/>
+          </p:nvPr>
+        </p:nvSpPr>
+        <p:spPr>
+          <a:xfrm>
+            <a:off x="3884613" y="0"/>
+            <a:ext cx="2971800" cy="458788"/>
+          </a:xfrm>
+          <a:prstGeom prst="rect">
+            <a:avLst/>
+          </a:prstGeom>
+        </p:spPr>
+        <p:txBody>
+          <a:bodyPr vert="horz" lIns="91440" tIns="45720" rIns="91440" bIns="45720" rtlCol="0"/>
+          <a:lstStyle>
+            <a:lvl1pPr algn="r">
+              <a:defRPr sz="1200"/>
+            </a:lvl1pPr>
+          </a:lstStyle>
+          <a:p>
+            <a:fld id="{3037630A-E226-EB4C-A273-174261FF974F}" type="datetimeFigureOut">
+              <a:rPr lang="en-DE" smtClean="0"/>
+              <a:t>06.05.22</a:t>
+            </a:fld>
+            <a:endParaRPr lang="en-DE"/>
+          </a:p>
+        </p:txBody>
+      </p:sp>
+      <p:sp>
+        <p:nvSpPr>
+          <p:cNvPr id="4" name="Slide Image Placeholder 3"/>
+          <p:cNvSpPr>
+            <a:spLocks noGrp="1" noRot="1" noChangeAspect="1"/>
+          </p:cNvSpPr>
+          <p:nvPr>
+            <p:ph type="sldImg" idx="2"/>
+          </p:nvPr>
+        </p:nvSpPr>
+        <p:spPr>
+          <a:xfrm>
+            <a:off x="814388" y="1143000"/>
+            <a:ext cx="5229225" cy="3086100"/>
+          </a:xfrm>
+          <a:prstGeom prst="rect">
+            <a:avLst/>
+          </a:prstGeom>
+          <a:noFill/>
+          <a:ln w="12700">
+            <a:solidFill>
+              <a:prstClr val="black"/>
+            </a:solidFill>
+          </a:ln>
+        </p:spPr>
+        <p:txBody>
+          <a:bodyPr vert="horz" lIns="91440" tIns="45720" rIns="91440" bIns="45720" rtlCol="0" anchor="ctr"/>
+          <a:lstStyle/>
+          <a:p>
+            <a:endParaRPr lang="en-DE"/>
+          </a:p>
+        </p:txBody>
+      </p:sp>
+      <p:sp>
+        <p:nvSpPr>
+          <p:cNvPr id="5" name="Notes Placeholder 4"/>
+          <p:cNvSpPr>
+            <a:spLocks noGrp="1"/>
+          </p:cNvSpPr>
+          <p:nvPr>
+            <p:ph type="body" sz="quarter" idx="3"/>
+          </p:nvPr>
+        </p:nvSpPr>
+        <p:spPr>
+          <a:xfrm>
+            <a:off x="685800" y="4400550"/>
+            <a:ext cx="5486400" cy="3600450"/>
+          </a:xfrm>
+          <a:prstGeom prst="rect">
+            <a:avLst/>
+          </a:prstGeom>
+        </p:spPr>
+        <p:txBody>
+          <a:bodyPr vert="horz" lIns="91440" tIns="45720" rIns="91440" bIns="45720" rtlCol="0"/>
+          <a:lstStyle/>
+          <a:p>
+            <a:pPr lvl="0"/>
+            <a:r>
+              <a:rPr lang="en-GB"/>
+              <a:t>Click to edit Master text styles</a:t>
+            </a:r>
+          </a:p>
+          <a:p>
+            <a:pPr lvl="1"/>
+            <a:r>
+              <a:rPr lang="en-GB"/>
+              <a:t>Second level</a:t>
+            </a:r>
+          </a:p>
+          <a:p>
+            <a:pPr lvl="2"/>
+            <a:r>
+              <a:rPr lang="en-GB"/>
+              <a:t>Third level</a:t>
+            </a:r>
+          </a:p>
+          <a:p>
+            <a:pPr lvl="3"/>
+            <a:r>
+              <a:rPr lang="en-GB"/>
+              <a:t>Fourth level</a:t>
+            </a:r>
+          </a:p>
+          <a:p>
+            <a:pPr lvl="4"/>
+            <a:r>
+              <a:rPr lang="en-GB"/>
+              <a:t>Fifth level</a:t>
+            </a:r>
+            <a:endParaRPr lang="en-DE"/>
+          </a:p>
+        </p:txBody>
+      </p:sp>
+      <p:sp>
+        <p:nvSpPr>
+          <p:cNvPr id="6" name="Footer Placeholder 5"/>
+          <p:cNvSpPr>
+            <a:spLocks noGrp="1"/>
+          </p:cNvSpPr>
+          <p:nvPr>
+            <p:ph type="ftr" sz="quarter" idx="4"/>
+          </p:nvPr>
+        </p:nvSpPr>
+        <p:spPr>
+          <a:xfrm>
+            <a:off x="0" y="8685213"/>
+            <a:ext cx="2971800" cy="458787"/>
+          </a:xfrm>
+          <a:prstGeom prst="rect">
+            <a:avLst/>
+          </a:prstGeom>
+        </p:spPr>
+        <p:txBody>
+          <a:bodyPr vert="horz" lIns="91440" tIns="45720" rIns="91440" bIns="45720" rtlCol="0" anchor="b"/>
+          <a:lstStyle>
+            <a:lvl1pPr algn="l">
+              <a:defRPr sz="1200"/>
+            </a:lvl1pPr>
+          </a:lstStyle>
+          <a:p>
+            <a:endParaRPr lang="en-DE"/>
+          </a:p>
+        </p:txBody>
+      </p:sp>
+      <p:sp>
+        <p:nvSpPr>
+          <p:cNvPr id="7" name="Slide Number Placeholder 6"/>
+          <p:cNvSpPr>
+            <a:spLocks noGrp="1"/>
+          </p:cNvSpPr>
+          <p:nvPr>
+            <p:ph type="sldNum" sz="quarter" idx="5"/>
+          </p:nvPr>
+        </p:nvSpPr>
+        <p:spPr>
+          <a:xfrm>
+            <a:off x="3884613" y="8685213"/>
+            <a:ext cx="2971800" cy="458787"/>
+          </a:xfrm>
+          <a:prstGeom prst="rect">
+            <a:avLst/>
+          </a:prstGeom>
+        </p:spPr>
+        <p:txBody>
+          <a:bodyPr vert="horz" lIns="91440" tIns="45720" rIns="91440" bIns="45720" rtlCol="0" anchor="b"/>
+          <a:lstStyle>
+            <a:lvl1pPr algn="r">
+              <a:defRPr sz="1200"/>
+            </a:lvl1pPr>
+          </a:lstStyle>
+          <a:p>
+            <a:fld id="{0EFC66A0-49FF-4F4E-A1F1-20916EAB1F62}" type="slidenum">
+              <a:rPr lang="en-DE" smtClean="0"/>
+              <a:t>‹#›</a:t>
+            </a:fld>
+            <a:endParaRPr lang="en-DE"/>
+          </a:p>
+        </p:txBody>
+      </p:sp>
+    </p:spTree>
+    <p:extLst>
+      <p:ext uri="{BB962C8B-B14F-4D97-AF65-F5344CB8AC3E}">
+        <p14:creationId xmlns:p14="http://schemas.microsoft.com/office/powerpoint/2010/main" val="1085587971"/>
+      </p:ext>
+    </p:extLst>
+  </p:cSld>
+  <p:clrMap bg1="lt1" tx1="dk1" bg2="lt2" tx2="dk2" accent1="accent1" accent2="accent2" accent3="accent3" accent4="accent4" accent5="accent5" accent6="accent6" hlink="hlink" folHlink="folHlink"/>
+  <p:notesStyle>
+    <a:lvl1pPr marL="0" algn="l" defTabSz="914400" rtl="0" eaLnBrk="1" latinLnBrk="0" hangingPunct="1">
+      <a:defRPr sz="1200" kern="1200">
+        <a:solidFill>
+          <a:schemeClr val="tx1"/>
+        </a:solidFill>
+        <a:latin typeface="+mn-lt"/>
+        <a:ea typeface="+mn-ea"/>
+        <a:cs typeface="+mn-cs"/>
+      </a:defRPr>
+    </a:lvl1pPr>
+    <a:lvl2pPr marL="457200" algn="l" defTabSz="914400" rtl="0" eaLnBrk="1" latinLnBrk="0" hangingPunct="1">
+      <a:defRPr sz="1200" kern="1200">
+        <a:solidFill>
+          <a:schemeClr val="tx1"/>
+        </a:solidFill>
+        <a:latin typeface="+mn-lt"/>
+        <a:ea typeface="+mn-ea"/>
+        <a:cs typeface="+mn-cs"/>
+      </a:defRPr>
+    </a:lvl2pPr>
+    <a:lvl3pPr marL="914400" algn="l" defTabSz="914400" rtl="0" eaLnBrk="1" latinLnBrk="0" hangingPunct="1">
+      <a:defRPr sz="1200" kern="1200">
+        <a:solidFill>
+          <a:schemeClr val="tx1"/>
+        </a:solidFill>
+        <a:latin typeface="+mn-lt"/>
+        <a:ea typeface="+mn-ea"/>
+        <a:cs typeface="+mn-cs"/>
+      </a:defRPr>
+    </a:lvl3pPr>
+    <a:lvl4pPr marL="1371600" algn="l" defTabSz="914400" rtl="0" eaLnBrk="1" latinLnBrk="0" hangingPunct="1">
+      <a:defRPr sz="1200" kern="1200">
+        <a:solidFill>
+          <a:schemeClr val="tx1"/>
+        </a:solidFill>
+        <a:latin typeface="+mn-lt"/>
+        <a:ea typeface="+mn-ea"/>
+        <a:cs typeface="+mn-cs"/>
+      </a:defRPr>
+    </a:lvl4pPr>
+    <a:lvl5pPr marL="1828800" algn="l" defTabSz="914400" rtl="0" eaLnBrk="1" latinLnBrk="0" hangingPunct="1">
+      <a:defRPr sz="1200" kern="1200">
+        <a:solidFill>
+          <a:schemeClr val="tx1"/>
+        </a:solidFill>
+        <a:latin typeface="+mn-lt"/>
+        <a:ea typeface="+mn-ea"/>
+        <a:cs typeface="+mn-cs"/>
+      </a:defRPr>
+    </a:lvl5pPr>
+    <a:lvl6pPr marL="2286000" algn="l" defTabSz="914400" rtl="0" eaLnBrk="1" latinLnBrk="0" hangingPunct="1">
+      <a:defRPr sz="1200" kern="1200">
+        <a:solidFill>
+          <a:schemeClr val="tx1"/>
+        </a:solidFill>
+        <a:latin typeface="+mn-lt"/>
+        <a:ea typeface="+mn-ea"/>
+        <a:cs typeface="+mn-cs"/>
+      </a:defRPr>
+    </a:lvl6pPr>
+    <a:lvl7pPr marL="2743200" algn="l" defTabSz="914400" rtl="0" eaLnBrk="1" latinLnBrk="0" hangingPunct="1">
+      <a:defRPr sz="1200" kern="1200">
+        <a:solidFill>
+          <a:schemeClr val="tx1"/>
+        </a:solidFill>
+        <a:latin typeface="+mn-lt"/>
+        <a:ea typeface="+mn-ea"/>
+        <a:cs typeface="+mn-cs"/>
+      </a:defRPr>
+    </a:lvl7pPr>
+    <a:lvl8pPr marL="3200400" algn="l" defTabSz="914400" rtl="0" eaLnBrk="1" latinLnBrk="0" hangingPunct="1">
+      <a:defRPr sz="1200" kern="1200">
+        <a:solidFill>
+          <a:schemeClr val="tx1"/>
+        </a:solidFill>
+        <a:latin typeface="+mn-lt"/>
+        <a:ea typeface="+mn-ea"/>
+        <a:cs typeface="+mn-cs"/>
+      </a:defRPr>
+    </a:lvl8pPr>
+    <a:lvl9pPr marL="3657600" algn="l" defTabSz="914400" rtl="0" eaLnBrk="1" latinLnBrk="0" hangingPunct="1">
+      <a:defRPr sz="1200" kern="1200">
+        <a:solidFill>
+          <a:schemeClr val="tx1"/>
+        </a:solidFill>
+        <a:latin typeface="+mn-lt"/>
+        <a:ea typeface="+mn-ea"/>
+        <a:cs typeface="+mn-cs"/>
+      </a:defRPr>
+    </a:lvl9pPr>
+  </p:notesStyle>
+</p:notesMaster>
+</file>
+
+<file path=ppt/notesSlides/notesSlide1.xml><?xml version="1.0" encoding="utf-8"?>
+<p:notes xmlns:a="http://schemas.openxmlformats.org/drawingml/2006/main" xmlns:r="http://schemas.openxmlformats.org/officeDocument/2006/relationships" xmlns:p="http://schemas.openxmlformats.org/presentationml/2006/main">
+  <p:cSld>
+    <p:spTree>
+      <p:nvGrpSpPr>
+        <p:cNvPr id="1" name=""/>
+        <p:cNvGrpSpPr/>
+        <p:nvPr/>
+      </p:nvGrpSpPr>
+      <p:grpSpPr>
+        <a:xfrm>
+          <a:off x="0" y="0"/>
+          <a:ext cx="0" cy="0"/>
+          <a:chOff x="0" y="0"/>
+          <a:chExt cx="0" cy="0"/>
+        </a:xfrm>
+      </p:grpSpPr>
+      <p:sp>
+        <p:nvSpPr>
+          <p:cNvPr id="2" name="Slide Image Placeholder 1"/>
+          <p:cNvSpPr>
+            <a:spLocks noGrp="1" noRot="1" noChangeAspect="1"/>
+          </p:cNvSpPr>
+          <p:nvPr>
+            <p:ph type="sldImg"/>
+          </p:nvPr>
+        </p:nvSpPr>
+        <p:spPr/>
+      </p:sp>
+      <p:sp>
+        <p:nvSpPr>
+          <p:cNvPr id="3" name="Notes Placeholder 2"/>
+          <p:cNvSpPr>
+            <a:spLocks noGrp="1"/>
+          </p:cNvSpPr>
+          <p:nvPr>
+            <p:ph type="body" idx="1"/>
+          </p:nvPr>
+        </p:nvSpPr>
+        <p:spPr/>
+        <p:txBody>
+          <a:bodyPr/>
+          <a:lstStyle/>
+          <a:p>
+            <a:endParaRPr lang="en-DE" dirty="0"/>
+          </a:p>
+        </p:txBody>
+      </p:sp>
+      <p:sp>
+        <p:nvSpPr>
+          <p:cNvPr id="4" name="Slide Number Placeholder 3"/>
+          <p:cNvSpPr>
+            <a:spLocks noGrp="1"/>
+          </p:cNvSpPr>
+          <p:nvPr>
+            <p:ph type="sldNum" sz="quarter" idx="5"/>
+          </p:nvPr>
+        </p:nvSpPr>
+        <p:spPr/>
+        <p:txBody>
+          <a:bodyPr/>
+          <a:lstStyle/>
+          <a:p>
+            <a:fld id="{0EFC66A0-49FF-4F4E-A1F1-20916EAB1F62}" type="slidenum">
+              <a:rPr lang="en-DE" smtClean="0"/>
+              <a:t>1</a:t>
+            </a:fld>
+            <a:endParaRPr lang="en-DE"/>
+          </a:p>
+        </p:txBody>
+      </p:sp>
+    </p:spTree>
+    <p:extLst>
+      <p:ext uri="{BB962C8B-B14F-4D97-AF65-F5344CB8AC3E}">
+        <p14:creationId xmlns:p14="http://schemas.microsoft.com/office/powerpoint/2010/main" val="2444116420"/>
+      </p:ext>
+    </p:extLst>
+  </p:cSld>
+  <p:clrMapOvr>
+    <a:masterClrMapping/>
+  </p:clrMapOvr>
+</p:notes>
 </file>
 
 <file path=ppt/slideLayouts/slideLayout1.xml><?xml version="1.0" encoding="utf-8"?>
@@ -152,15 +589,15 @@
         </p:nvSpPr>
         <p:spPr>
           <a:xfrm>
-            <a:off x="2744986" y="1885414"/>
-            <a:ext cx="16469916" cy="4010837"/>
+            <a:off x="2744986" y="2121058"/>
+            <a:ext cx="16469916" cy="4512122"/>
           </a:xfrm>
         </p:spPr>
         <p:txBody>
           <a:bodyPr anchor="b"/>
           <a:lstStyle>
             <a:lvl1pPr algn="ctr">
-              <a:defRPr sz="10079"/>
+              <a:defRPr sz="10807"/>
             </a:lvl1pPr>
           </a:lstStyle>
           <a:p>
@@ -184,8 +621,8 @@
         </p:nvSpPr>
         <p:spPr>
           <a:xfrm>
-            <a:off x="2744986" y="6050924"/>
-            <a:ext cx="16469916" cy="2781450"/>
+            <a:off x="2744986" y="6807185"/>
+            <a:ext cx="16469916" cy="3129084"/>
           </a:xfrm>
         </p:spPr>
         <p:txBody>
@@ -193,39 +630,39 @@
           <a:lstStyle>
             <a:lvl1pPr marL="0" indent="0" algn="ctr">
               <a:buNone/>
-              <a:defRPr sz="4032"/>
+              <a:defRPr sz="4323"/>
             </a:lvl1pPr>
-            <a:lvl2pPr marL="768050" indent="0" algn="ctr">
-              <a:buNone/>
-              <a:defRPr sz="3360"/>
+            <a:lvl2pPr marL="823509" indent="0" algn="ctr">
+              <a:buNone/>
+              <a:defRPr sz="3602"/>
             </a:lvl2pPr>
-            <a:lvl3pPr marL="1536101" indent="0" algn="ctr">
-              <a:buNone/>
-              <a:defRPr sz="3024"/>
+            <a:lvl3pPr marL="1647017" indent="0" algn="ctr">
+              <a:buNone/>
+              <a:defRPr sz="3242"/>
             </a:lvl3pPr>
-            <a:lvl4pPr marL="2304151" indent="0" algn="ctr">
-              <a:buNone/>
-              <a:defRPr sz="2688"/>
+            <a:lvl4pPr marL="2470526" indent="0" algn="ctr">
+              <a:buNone/>
+              <a:defRPr sz="2882"/>
             </a:lvl4pPr>
-            <a:lvl5pPr marL="3072201" indent="0" algn="ctr">
-              <a:buNone/>
-              <a:defRPr sz="2688"/>
+            <a:lvl5pPr marL="3294035" indent="0" algn="ctr">
+              <a:buNone/>
+              <a:defRPr sz="2882"/>
             </a:lvl5pPr>
-            <a:lvl6pPr marL="3840251" indent="0" algn="ctr">
-              <a:buNone/>
-              <a:defRPr sz="2688"/>
+            <a:lvl6pPr marL="4117543" indent="0" algn="ctr">
+              <a:buNone/>
+              <a:defRPr sz="2882"/>
             </a:lvl6pPr>
-            <a:lvl7pPr marL="4608302" indent="0" algn="ctr">
-              <a:buNone/>
-              <a:defRPr sz="2688"/>
+            <a:lvl7pPr marL="4941052" indent="0" algn="ctr">
+              <a:buNone/>
+              <a:defRPr sz="2882"/>
             </a:lvl7pPr>
-            <a:lvl8pPr marL="5376352" indent="0" algn="ctr">
-              <a:buNone/>
-              <a:defRPr sz="2688"/>
+            <a:lvl8pPr marL="5764560" indent="0" algn="ctr">
+              <a:buNone/>
+              <a:defRPr sz="2882"/>
             </a:lvl8pPr>
-            <a:lvl9pPr marL="6144402" indent="0" algn="ctr">
-              <a:buNone/>
-              <a:defRPr sz="2688"/>
+            <a:lvl9pPr marL="6588069" indent="0" algn="ctr">
+              <a:buNone/>
+              <a:defRPr sz="2882"/>
             </a:lvl9pPr>
           </a:lstStyle>
           <a:p>
@@ -254,7 +691,7 @@
           <a:p>
             <a:fld id="{70F68FBA-1141-104B-97C3-EBEB31FE0037}" type="datetimeFigureOut">
               <a:rPr lang="en-DE" smtClean="0"/>
-              <a:t>27.02.22</a:t>
+              <a:t>06.05.22</a:t>
             </a:fld>
             <a:endParaRPr lang="en-DE"/>
           </a:p>
@@ -305,7 +742,7 @@
     </p:spTree>
     <p:extLst>
       <p:ext uri="{BB962C8B-B14F-4D97-AF65-F5344CB8AC3E}">
-        <p14:creationId xmlns:p14="http://schemas.microsoft.com/office/powerpoint/2010/main" val="1653872184"/>
+        <p14:creationId xmlns:p14="http://schemas.microsoft.com/office/powerpoint/2010/main" val="1477181339"/>
       </p:ext>
     </p:extLst>
   </p:cSld>
@@ -424,7 +861,7 @@
           <a:p>
             <a:fld id="{70F68FBA-1141-104B-97C3-EBEB31FE0037}" type="datetimeFigureOut">
               <a:rPr lang="en-DE" smtClean="0"/>
-              <a:t>27.02.22</a:t>
+              <a:t>06.05.22</a:t>
             </a:fld>
             <a:endParaRPr lang="en-DE"/>
           </a:p>
@@ -475,7 +912,7 @@
     </p:spTree>
     <p:extLst>
       <p:ext uri="{BB962C8B-B14F-4D97-AF65-F5344CB8AC3E}">
-        <p14:creationId xmlns:p14="http://schemas.microsoft.com/office/powerpoint/2010/main" val="133827705"/>
+        <p14:creationId xmlns:p14="http://schemas.microsoft.com/office/powerpoint/2010/main" val="2565288709"/>
       </p:ext>
     </p:extLst>
   </p:cSld>
@@ -514,8 +951,8 @@
         </p:nvSpPr>
         <p:spPr>
           <a:xfrm>
-            <a:off x="15715045" y="613359"/>
-            <a:ext cx="4735101" cy="9763081"/>
+            <a:off x="15715045" y="690018"/>
+            <a:ext cx="4735101" cy="10983298"/>
           </a:xfrm>
         </p:spPr>
         <p:txBody>
@@ -542,8 +979,8 @@
         </p:nvSpPr>
         <p:spPr>
           <a:xfrm>
-            <a:off x="1509742" y="613359"/>
-            <a:ext cx="13930804" cy="9763081"/>
+            <a:off x="1509742" y="690018"/>
+            <a:ext cx="13930804" cy="10983298"/>
           </a:xfrm>
         </p:spPr>
         <p:txBody>
@@ -604,7 +1041,7 @@
           <a:p>
             <a:fld id="{70F68FBA-1141-104B-97C3-EBEB31FE0037}" type="datetimeFigureOut">
               <a:rPr lang="en-DE" smtClean="0"/>
-              <a:t>27.02.22</a:t>
+              <a:t>06.05.22</a:t>
             </a:fld>
             <a:endParaRPr lang="en-DE"/>
           </a:p>
@@ -655,7 +1092,7 @@
     </p:spTree>
     <p:extLst>
       <p:ext uri="{BB962C8B-B14F-4D97-AF65-F5344CB8AC3E}">
-        <p14:creationId xmlns:p14="http://schemas.microsoft.com/office/powerpoint/2010/main" val="1919508069"/>
+        <p14:creationId xmlns:p14="http://schemas.microsoft.com/office/powerpoint/2010/main" val="482142334"/>
       </p:ext>
     </p:extLst>
   </p:cSld>
@@ -774,7 +1211,7 @@
           <a:p>
             <a:fld id="{70F68FBA-1141-104B-97C3-EBEB31FE0037}" type="datetimeFigureOut">
               <a:rPr lang="en-DE" smtClean="0"/>
-              <a:t>27.02.22</a:t>
+              <a:t>06.05.22</a:t>
             </a:fld>
             <a:endParaRPr lang="en-DE"/>
           </a:p>
@@ -825,7 +1262,7 @@
     </p:spTree>
     <p:extLst>
       <p:ext uri="{BB962C8B-B14F-4D97-AF65-F5344CB8AC3E}">
-        <p14:creationId xmlns:p14="http://schemas.microsoft.com/office/powerpoint/2010/main" val="1219391200"/>
+        <p14:creationId xmlns:p14="http://schemas.microsoft.com/office/powerpoint/2010/main" val="31817151"/>
       </p:ext>
     </p:extLst>
   </p:cSld>
@@ -864,15 +1301,15 @@
         </p:nvSpPr>
         <p:spPr>
           <a:xfrm>
-            <a:off x="1498305" y="2872123"/>
-            <a:ext cx="18940403" cy="4792202"/>
+            <a:off x="1498305" y="3231089"/>
+            <a:ext cx="18940403" cy="5391145"/>
           </a:xfrm>
         </p:spPr>
         <p:txBody>
           <a:bodyPr anchor="b"/>
           <a:lstStyle>
             <a:lvl1pPr>
-              <a:defRPr sz="10079"/>
+              <a:defRPr sz="10807"/>
             </a:lvl1pPr>
           </a:lstStyle>
           <a:p>
@@ -896,8 +1333,8 @@
         </p:nvSpPr>
         <p:spPr>
           <a:xfrm>
-            <a:off x="1498305" y="7709662"/>
-            <a:ext cx="18940403" cy="2520106"/>
+            <a:off x="1498305" y="8673236"/>
+            <a:ext cx="18940403" cy="2835076"/>
           </a:xfrm>
         </p:spPr>
         <p:txBody>
@@ -905,7 +1342,7 @@
           <a:lstStyle>
             <a:lvl1pPr marL="0" indent="0">
               <a:buNone/>
-              <a:defRPr sz="4032">
+              <a:defRPr sz="4323">
                 <a:solidFill>
                   <a:schemeClr val="tx1">
                     <a:tint val="75000"/>
@@ -913,9 +1350,9 @@
                 </a:solidFill>
               </a:defRPr>
             </a:lvl1pPr>
-            <a:lvl2pPr marL="768050" indent="0">
-              <a:buNone/>
-              <a:defRPr sz="3360">
+            <a:lvl2pPr marL="823509" indent="0">
+              <a:buNone/>
+              <a:defRPr sz="3602">
                 <a:solidFill>
                   <a:schemeClr val="tx1">
                     <a:tint val="75000"/>
@@ -923,9 +1360,9 @@
                 </a:solidFill>
               </a:defRPr>
             </a:lvl2pPr>
-            <a:lvl3pPr marL="1536101" indent="0">
-              <a:buNone/>
-              <a:defRPr sz="3024">
+            <a:lvl3pPr marL="1647017" indent="0">
+              <a:buNone/>
+              <a:defRPr sz="3242">
                 <a:solidFill>
                   <a:schemeClr val="tx1">
                     <a:tint val="75000"/>
@@ -933,9 +1370,9 @@
                 </a:solidFill>
               </a:defRPr>
             </a:lvl3pPr>
-            <a:lvl4pPr marL="2304151" indent="0">
-              <a:buNone/>
-              <a:defRPr sz="2688">
+            <a:lvl4pPr marL="2470526" indent="0">
+              <a:buNone/>
+              <a:defRPr sz="2882">
                 <a:solidFill>
                   <a:schemeClr val="tx1">
                     <a:tint val="75000"/>
@@ -943,9 +1380,9 @@
                 </a:solidFill>
               </a:defRPr>
             </a:lvl4pPr>
-            <a:lvl5pPr marL="3072201" indent="0">
-              <a:buNone/>
-              <a:defRPr sz="2688">
+            <a:lvl5pPr marL="3294035" indent="0">
+              <a:buNone/>
+              <a:defRPr sz="2882">
                 <a:solidFill>
                   <a:schemeClr val="tx1">
                     <a:tint val="75000"/>
@@ -953,9 +1390,9 @@
                 </a:solidFill>
               </a:defRPr>
             </a:lvl5pPr>
-            <a:lvl6pPr marL="3840251" indent="0">
-              <a:buNone/>
-              <a:defRPr sz="2688">
+            <a:lvl6pPr marL="4117543" indent="0">
+              <a:buNone/>
+              <a:defRPr sz="2882">
                 <a:solidFill>
                   <a:schemeClr val="tx1">
                     <a:tint val="75000"/>
@@ -963,9 +1400,9 @@
                 </a:solidFill>
               </a:defRPr>
             </a:lvl6pPr>
-            <a:lvl7pPr marL="4608302" indent="0">
-              <a:buNone/>
-              <a:defRPr sz="2688">
+            <a:lvl7pPr marL="4941052" indent="0">
+              <a:buNone/>
+              <a:defRPr sz="2882">
                 <a:solidFill>
                   <a:schemeClr val="tx1">
                     <a:tint val="75000"/>
@@ -973,9 +1410,9 @@
                 </a:solidFill>
               </a:defRPr>
             </a:lvl7pPr>
-            <a:lvl8pPr marL="5376352" indent="0">
-              <a:buNone/>
-              <a:defRPr sz="2688">
+            <a:lvl8pPr marL="5764560" indent="0">
+              <a:buNone/>
+              <a:defRPr sz="2882">
                 <a:solidFill>
                   <a:schemeClr val="tx1">
                     <a:tint val="75000"/>
@@ -983,9 +1420,9 @@
                 </a:solidFill>
               </a:defRPr>
             </a:lvl8pPr>
-            <a:lvl9pPr marL="6144402" indent="0">
-              <a:buNone/>
-              <a:defRPr sz="2688">
+            <a:lvl9pPr marL="6588069" indent="0">
+              <a:buNone/>
+              <a:defRPr sz="2882">
                 <a:solidFill>
                   <a:schemeClr val="tx1">
                     <a:tint val="75000"/>
@@ -1020,7 +1457,7 @@
           <a:p>
             <a:fld id="{70F68FBA-1141-104B-97C3-EBEB31FE0037}" type="datetimeFigureOut">
               <a:rPr lang="en-DE" smtClean="0"/>
-              <a:t>27.02.22</a:t>
+              <a:t>06.05.22</a:t>
             </a:fld>
             <a:endParaRPr lang="en-DE"/>
           </a:p>
@@ -1071,7 +1508,7 @@
     </p:spTree>
     <p:extLst>
       <p:ext uri="{BB962C8B-B14F-4D97-AF65-F5344CB8AC3E}">
-        <p14:creationId xmlns:p14="http://schemas.microsoft.com/office/powerpoint/2010/main" val="2521220466"/>
+        <p14:creationId xmlns:p14="http://schemas.microsoft.com/office/powerpoint/2010/main" val="1564850060"/>
       </p:ext>
     </p:extLst>
   </p:cSld>
@@ -1133,8 +1570,8 @@
         </p:nvSpPr>
         <p:spPr>
           <a:xfrm>
-            <a:off x="1509743" y="3066796"/>
-            <a:ext cx="9332952" cy="7309644"/>
+            <a:off x="1509743" y="3450093"/>
+            <a:ext cx="9332952" cy="8223223"/>
           </a:xfrm>
         </p:spPr>
         <p:txBody>
@@ -1190,8 +1627,8 @@
         </p:nvSpPr>
         <p:spPr>
           <a:xfrm>
-            <a:off x="11117194" y="3066796"/>
-            <a:ext cx="9332952" cy="7309644"/>
+            <a:off x="11117194" y="3450093"/>
+            <a:ext cx="9332952" cy="8223223"/>
           </a:xfrm>
         </p:spPr>
         <p:txBody>
@@ -1252,7 +1689,7 @@
           <a:p>
             <a:fld id="{70F68FBA-1141-104B-97C3-EBEB31FE0037}" type="datetimeFigureOut">
               <a:rPr lang="en-DE" smtClean="0"/>
-              <a:t>27.02.22</a:t>
+              <a:t>06.05.22</a:t>
             </a:fld>
             <a:endParaRPr lang="en-DE"/>
           </a:p>
@@ -1303,7 +1740,7 @@
     </p:spTree>
     <p:extLst>
       <p:ext uri="{BB962C8B-B14F-4D97-AF65-F5344CB8AC3E}">
-        <p14:creationId xmlns:p14="http://schemas.microsoft.com/office/powerpoint/2010/main" val="2148188085"/>
+        <p14:creationId xmlns:p14="http://schemas.microsoft.com/office/powerpoint/2010/main" val="1658243429"/>
       </p:ext>
     </p:extLst>
   </p:cSld>
@@ -1342,8 +1779,8 @@
         </p:nvSpPr>
         <p:spPr>
           <a:xfrm>
-            <a:off x="1512603" y="613360"/>
-            <a:ext cx="18940403" cy="2226762"/>
+            <a:off x="1512603" y="690019"/>
+            <a:ext cx="18940403" cy="2505069"/>
           </a:xfrm>
         </p:spPr>
         <p:txBody>
@@ -1370,8 +1807,8 @@
         </p:nvSpPr>
         <p:spPr>
           <a:xfrm>
-            <a:off x="1512604" y="2824120"/>
-            <a:ext cx="9290061" cy="1384058"/>
+            <a:off x="1512604" y="3177087"/>
+            <a:ext cx="9290061" cy="1557041"/>
           </a:xfrm>
         </p:spPr>
         <p:txBody>
@@ -1379,39 +1816,39 @@
           <a:lstStyle>
             <a:lvl1pPr marL="0" indent="0">
               <a:buNone/>
-              <a:defRPr sz="4032" b="1"/>
+              <a:defRPr sz="4323" b="1"/>
             </a:lvl1pPr>
-            <a:lvl2pPr marL="768050" indent="0">
-              <a:buNone/>
-              <a:defRPr sz="3360" b="1"/>
+            <a:lvl2pPr marL="823509" indent="0">
+              <a:buNone/>
+              <a:defRPr sz="3602" b="1"/>
             </a:lvl2pPr>
-            <a:lvl3pPr marL="1536101" indent="0">
-              <a:buNone/>
-              <a:defRPr sz="3024" b="1"/>
+            <a:lvl3pPr marL="1647017" indent="0">
+              <a:buNone/>
+              <a:defRPr sz="3242" b="1"/>
             </a:lvl3pPr>
-            <a:lvl4pPr marL="2304151" indent="0">
-              <a:buNone/>
-              <a:defRPr sz="2688" b="1"/>
+            <a:lvl4pPr marL="2470526" indent="0">
+              <a:buNone/>
+              <a:defRPr sz="2882" b="1"/>
             </a:lvl4pPr>
-            <a:lvl5pPr marL="3072201" indent="0">
-              <a:buNone/>
-              <a:defRPr sz="2688" b="1"/>
+            <a:lvl5pPr marL="3294035" indent="0">
+              <a:buNone/>
+              <a:defRPr sz="2882" b="1"/>
             </a:lvl5pPr>
-            <a:lvl6pPr marL="3840251" indent="0">
-              <a:buNone/>
-              <a:defRPr sz="2688" b="1"/>
+            <a:lvl6pPr marL="4117543" indent="0">
+              <a:buNone/>
+              <a:defRPr sz="2882" b="1"/>
             </a:lvl6pPr>
-            <a:lvl7pPr marL="4608302" indent="0">
-              <a:buNone/>
-              <a:defRPr sz="2688" b="1"/>
+            <a:lvl7pPr marL="4941052" indent="0">
+              <a:buNone/>
+              <a:defRPr sz="2882" b="1"/>
             </a:lvl7pPr>
-            <a:lvl8pPr marL="5376352" indent="0">
-              <a:buNone/>
-              <a:defRPr sz="2688" b="1"/>
+            <a:lvl8pPr marL="5764560" indent="0">
+              <a:buNone/>
+              <a:defRPr sz="2882" b="1"/>
             </a:lvl8pPr>
-            <a:lvl9pPr marL="6144402" indent="0">
-              <a:buNone/>
-              <a:defRPr sz="2688" b="1"/>
+            <a:lvl9pPr marL="6588069" indent="0">
+              <a:buNone/>
+              <a:defRPr sz="2882" b="1"/>
             </a:lvl9pPr>
           </a:lstStyle>
           <a:p>
@@ -1435,8 +1872,8 @@
         </p:nvSpPr>
         <p:spPr>
           <a:xfrm>
-            <a:off x="1512604" y="4208178"/>
-            <a:ext cx="9290061" cy="6189596"/>
+            <a:off x="1512604" y="4734128"/>
+            <a:ext cx="9290061" cy="6963189"/>
           </a:xfrm>
         </p:spPr>
         <p:txBody>
@@ -1492,8 +1929,8 @@
         </p:nvSpPr>
         <p:spPr>
           <a:xfrm>
-            <a:off x="11117193" y="2824120"/>
-            <a:ext cx="9335813" cy="1384058"/>
+            <a:off x="11117193" y="3177087"/>
+            <a:ext cx="9335813" cy="1557041"/>
           </a:xfrm>
         </p:spPr>
         <p:txBody>
@@ -1501,39 +1938,39 @@
           <a:lstStyle>
             <a:lvl1pPr marL="0" indent="0">
               <a:buNone/>
-              <a:defRPr sz="4032" b="1"/>
+              <a:defRPr sz="4323" b="1"/>
             </a:lvl1pPr>
-            <a:lvl2pPr marL="768050" indent="0">
-              <a:buNone/>
-              <a:defRPr sz="3360" b="1"/>
+            <a:lvl2pPr marL="823509" indent="0">
+              <a:buNone/>
+              <a:defRPr sz="3602" b="1"/>
             </a:lvl2pPr>
-            <a:lvl3pPr marL="1536101" indent="0">
-              <a:buNone/>
-              <a:defRPr sz="3024" b="1"/>
+            <a:lvl3pPr marL="1647017" indent="0">
+              <a:buNone/>
+              <a:defRPr sz="3242" b="1"/>
             </a:lvl3pPr>
-            <a:lvl4pPr marL="2304151" indent="0">
-              <a:buNone/>
-              <a:defRPr sz="2688" b="1"/>
+            <a:lvl4pPr marL="2470526" indent="0">
+              <a:buNone/>
+              <a:defRPr sz="2882" b="1"/>
             </a:lvl4pPr>
-            <a:lvl5pPr marL="3072201" indent="0">
-              <a:buNone/>
-              <a:defRPr sz="2688" b="1"/>
+            <a:lvl5pPr marL="3294035" indent="0">
+              <a:buNone/>
+              <a:defRPr sz="2882" b="1"/>
             </a:lvl5pPr>
-            <a:lvl6pPr marL="3840251" indent="0">
-              <a:buNone/>
-              <a:defRPr sz="2688" b="1"/>
+            <a:lvl6pPr marL="4117543" indent="0">
+              <a:buNone/>
+              <a:defRPr sz="2882" b="1"/>
             </a:lvl6pPr>
-            <a:lvl7pPr marL="4608302" indent="0">
-              <a:buNone/>
-              <a:defRPr sz="2688" b="1"/>
+            <a:lvl7pPr marL="4941052" indent="0">
+              <a:buNone/>
+              <a:defRPr sz="2882" b="1"/>
             </a:lvl7pPr>
-            <a:lvl8pPr marL="5376352" indent="0">
-              <a:buNone/>
-              <a:defRPr sz="2688" b="1"/>
+            <a:lvl8pPr marL="5764560" indent="0">
+              <a:buNone/>
+              <a:defRPr sz="2882" b="1"/>
             </a:lvl8pPr>
-            <a:lvl9pPr marL="6144402" indent="0">
-              <a:buNone/>
-              <a:defRPr sz="2688" b="1"/>
+            <a:lvl9pPr marL="6588069" indent="0">
+              <a:buNone/>
+              <a:defRPr sz="2882" b="1"/>
             </a:lvl9pPr>
           </a:lstStyle>
           <a:p>
@@ -1557,8 +1994,8 @@
         </p:nvSpPr>
         <p:spPr>
           <a:xfrm>
-            <a:off x="11117193" y="4208178"/>
-            <a:ext cx="9335813" cy="6189596"/>
+            <a:off x="11117193" y="4734128"/>
+            <a:ext cx="9335813" cy="6963189"/>
           </a:xfrm>
         </p:spPr>
         <p:txBody>
@@ -1619,7 +2056,7 @@
           <a:p>
             <a:fld id="{70F68FBA-1141-104B-97C3-EBEB31FE0037}" type="datetimeFigureOut">
               <a:rPr lang="en-DE" smtClean="0"/>
-              <a:t>27.02.22</a:t>
+              <a:t>06.05.22</a:t>
             </a:fld>
             <a:endParaRPr lang="en-DE"/>
           </a:p>
@@ -1670,7 +2107,7 @@
     </p:spTree>
     <p:extLst>
       <p:ext uri="{BB962C8B-B14F-4D97-AF65-F5344CB8AC3E}">
-        <p14:creationId xmlns:p14="http://schemas.microsoft.com/office/powerpoint/2010/main" val="337868060"/>
+        <p14:creationId xmlns:p14="http://schemas.microsoft.com/office/powerpoint/2010/main" val="870424733"/>
       </p:ext>
     </p:extLst>
   </p:cSld>
@@ -1737,7 +2174,7 @@
           <a:p>
             <a:fld id="{70F68FBA-1141-104B-97C3-EBEB31FE0037}" type="datetimeFigureOut">
               <a:rPr lang="en-DE" smtClean="0"/>
-              <a:t>27.02.22</a:t>
+              <a:t>06.05.22</a:t>
             </a:fld>
             <a:endParaRPr lang="en-DE"/>
           </a:p>
@@ -1788,7 +2225,7 @@
     </p:spTree>
     <p:extLst>
       <p:ext uri="{BB962C8B-B14F-4D97-AF65-F5344CB8AC3E}">
-        <p14:creationId xmlns:p14="http://schemas.microsoft.com/office/powerpoint/2010/main" val="1345652711"/>
+        <p14:creationId xmlns:p14="http://schemas.microsoft.com/office/powerpoint/2010/main" val="984626734"/>
       </p:ext>
     </p:extLst>
   </p:cSld>
@@ -1832,7 +2269,7 @@
           <a:p>
             <a:fld id="{70F68FBA-1141-104B-97C3-EBEB31FE0037}" type="datetimeFigureOut">
               <a:rPr lang="en-DE" smtClean="0"/>
-              <a:t>27.02.22</a:t>
+              <a:t>06.05.22</a:t>
             </a:fld>
             <a:endParaRPr lang="en-DE"/>
           </a:p>
@@ -1883,7 +2320,7 @@
     </p:spTree>
     <p:extLst>
       <p:ext uri="{BB962C8B-B14F-4D97-AF65-F5344CB8AC3E}">
-        <p14:creationId xmlns:p14="http://schemas.microsoft.com/office/powerpoint/2010/main" val="2043556897"/>
+        <p14:creationId xmlns:p14="http://schemas.microsoft.com/office/powerpoint/2010/main" val="2649238981"/>
       </p:ext>
     </p:extLst>
   </p:cSld>
@@ -1922,15 +2359,15 @@
         </p:nvSpPr>
         <p:spPr>
           <a:xfrm>
-            <a:off x="1512603" y="768032"/>
-            <a:ext cx="7082635" cy="2688114"/>
+            <a:off x="1512603" y="864023"/>
+            <a:ext cx="7082635" cy="3024082"/>
           </a:xfrm>
         </p:spPr>
         <p:txBody>
           <a:bodyPr anchor="b"/>
           <a:lstStyle>
             <a:lvl1pPr>
-              <a:defRPr sz="5376"/>
+              <a:defRPr sz="5764"/>
             </a:lvl1pPr>
           </a:lstStyle>
           <a:p>
@@ -1954,39 +2391,39 @@
         </p:nvSpPr>
         <p:spPr>
           <a:xfrm>
-            <a:off x="9335813" y="1658738"/>
-            <a:ext cx="11117193" cy="8187013"/>
+            <a:off x="9335813" y="1866051"/>
+            <a:ext cx="11117193" cy="9210249"/>
           </a:xfrm>
         </p:spPr>
         <p:txBody>
           <a:bodyPr/>
           <a:lstStyle>
             <a:lvl1pPr>
-              <a:defRPr sz="5376"/>
+              <a:defRPr sz="5764"/>
             </a:lvl1pPr>
             <a:lvl2pPr>
-              <a:defRPr sz="4704"/>
+              <a:defRPr sz="5043"/>
             </a:lvl2pPr>
             <a:lvl3pPr>
-              <a:defRPr sz="4032"/>
+              <a:defRPr sz="4323"/>
             </a:lvl3pPr>
             <a:lvl4pPr>
-              <a:defRPr sz="3360"/>
+              <a:defRPr sz="3602"/>
             </a:lvl4pPr>
             <a:lvl5pPr>
-              <a:defRPr sz="3360"/>
+              <a:defRPr sz="3602"/>
             </a:lvl5pPr>
             <a:lvl6pPr>
-              <a:defRPr sz="3360"/>
+              <a:defRPr sz="3602"/>
             </a:lvl6pPr>
             <a:lvl7pPr>
-              <a:defRPr sz="3360"/>
+              <a:defRPr sz="3602"/>
             </a:lvl7pPr>
             <a:lvl8pPr>
-              <a:defRPr sz="3360"/>
+              <a:defRPr sz="3602"/>
             </a:lvl8pPr>
             <a:lvl9pPr>
-              <a:defRPr sz="3360"/>
+              <a:defRPr sz="3602"/>
             </a:lvl9pPr>
           </a:lstStyle>
           <a:p>
@@ -2039,8 +2476,8 @@
         </p:nvSpPr>
         <p:spPr>
           <a:xfrm>
-            <a:off x="1512603" y="3456146"/>
-            <a:ext cx="7082635" cy="6402939"/>
+            <a:off x="1512603" y="3888105"/>
+            <a:ext cx="7082635" cy="7203195"/>
           </a:xfrm>
         </p:spPr>
         <p:txBody>
@@ -2048,39 +2485,39 @@
           <a:lstStyle>
             <a:lvl1pPr marL="0" indent="0">
               <a:buNone/>
-              <a:defRPr sz="2688"/>
+              <a:defRPr sz="2882"/>
             </a:lvl1pPr>
-            <a:lvl2pPr marL="768050" indent="0">
-              <a:buNone/>
-              <a:defRPr sz="2352"/>
+            <a:lvl2pPr marL="823509" indent="0">
+              <a:buNone/>
+              <a:defRPr sz="2522"/>
             </a:lvl2pPr>
-            <a:lvl3pPr marL="1536101" indent="0">
-              <a:buNone/>
-              <a:defRPr sz="2016"/>
+            <a:lvl3pPr marL="1647017" indent="0">
+              <a:buNone/>
+              <a:defRPr sz="2161"/>
             </a:lvl3pPr>
-            <a:lvl4pPr marL="2304151" indent="0">
-              <a:buNone/>
-              <a:defRPr sz="1680"/>
+            <a:lvl4pPr marL="2470526" indent="0">
+              <a:buNone/>
+              <a:defRPr sz="1801"/>
             </a:lvl4pPr>
-            <a:lvl5pPr marL="3072201" indent="0">
-              <a:buNone/>
-              <a:defRPr sz="1680"/>
+            <a:lvl5pPr marL="3294035" indent="0">
+              <a:buNone/>
+              <a:defRPr sz="1801"/>
             </a:lvl5pPr>
-            <a:lvl6pPr marL="3840251" indent="0">
-              <a:buNone/>
-              <a:defRPr sz="1680"/>
+            <a:lvl6pPr marL="4117543" indent="0">
+              <a:buNone/>
+              <a:defRPr sz="1801"/>
             </a:lvl6pPr>
-            <a:lvl7pPr marL="4608302" indent="0">
-              <a:buNone/>
-              <a:defRPr sz="1680"/>
+            <a:lvl7pPr marL="4941052" indent="0">
+              <a:buNone/>
+              <a:defRPr sz="1801"/>
             </a:lvl7pPr>
-            <a:lvl8pPr marL="5376352" indent="0">
-              <a:buNone/>
-              <a:defRPr sz="1680"/>
+            <a:lvl8pPr marL="5764560" indent="0">
+              <a:buNone/>
+              <a:defRPr sz="1801"/>
             </a:lvl8pPr>
-            <a:lvl9pPr marL="6144402" indent="0">
-              <a:buNone/>
-              <a:defRPr sz="1680"/>
+            <a:lvl9pPr marL="6588069" indent="0">
+              <a:buNone/>
+              <a:defRPr sz="1801"/>
             </a:lvl9pPr>
           </a:lstStyle>
           <a:p>
@@ -2109,7 +2546,7 @@
           <a:p>
             <a:fld id="{70F68FBA-1141-104B-97C3-EBEB31FE0037}" type="datetimeFigureOut">
               <a:rPr lang="en-DE" smtClean="0"/>
-              <a:t>27.02.22</a:t>
+              <a:t>06.05.22</a:t>
             </a:fld>
             <a:endParaRPr lang="en-DE"/>
           </a:p>
@@ -2160,7 +2597,7 @@
     </p:spTree>
     <p:extLst>
       <p:ext uri="{BB962C8B-B14F-4D97-AF65-F5344CB8AC3E}">
-        <p14:creationId xmlns:p14="http://schemas.microsoft.com/office/powerpoint/2010/main" val="3369477650"/>
+        <p14:creationId xmlns:p14="http://schemas.microsoft.com/office/powerpoint/2010/main" val="3441020149"/>
       </p:ext>
     </p:extLst>
   </p:cSld>
@@ -2199,15 +2636,15 @@
         </p:nvSpPr>
         <p:spPr>
           <a:xfrm>
-            <a:off x="1512603" y="768032"/>
-            <a:ext cx="7082635" cy="2688114"/>
+            <a:off x="1512603" y="864023"/>
+            <a:ext cx="7082635" cy="3024082"/>
           </a:xfrm>
         </p:spPr>
         <p:txBody>
           <a:bodyPr anchor="b"/>
           <a:lstStyle>
             <a:lvl1pPr>
-              <a:defRPr sz="5376"/>
+              <a:defRPr sz="5764"/>
             </a:lvl1pPr>
           </a:lstStyle>
           <a:p>
@@ -2231,8 +2668,8 @@
         </p:nvSpPr>
         <p:spPr>
           <a:xfrm>
-            <a:off x="9335813" y="1658738"/>
-            <a:ext cx="11117193" cy="8187013"/>
+            <a:off x="9335813" y="1866051"/>
+            <a:ext cx="11117193" cy="9210249"/>
           </a:xfrm>
         </p:spPr>
         <p:txBody>
@@ -2240,39 +2677,39 @@
           <a:lstStyle>
             <a:lvl1pPr marL="0" indent="0">
               <a:buNone/>
-              <a:defRPr sz="5376"/>
+              <a:defRPr sz="5764"/>
             </a:lvl1pPr>
-            <a:lvl2pPr marL="768050" indent="0">
-              <a:buNone/>
-              <a:defRPr sz="4704"/>
+            <a:lvl2pPr marL="823509" indent="0">
+              <a:buNone/>
+              <a:defRPr sz="5043"/>
             </a:lvl2pPr>
-            <a:lvl3pPr marL="1536101" indent="0">
-              <a:buNone/>
-              <a:defRPr sz="4032"/>
+            <a:lvl3pPr marL="1647017" indent="0">
+              <a:buNone/>
+              <a:defRPr sz="4323"/>
             </a:lvl3pPr>
-            <a:lvl4pPr marL="2304151" indent="0">
-              <a:buNone/>
-              <a:defRPr sz="3360"/>
+            <a:lvl4pPr marL="2470526" indent="0">
+              <a:buNone/>
+              <a:defRPr sz="3602"/>
             </a:lvl4pPr>
-            <a:lvl5pPr marL="3072201" indent="0">
-              <a:buNone/>
-              <a:defRPr sz="3360"/>
+            <a:lvl5pPr marL="3294035" indent="0">
+              <a:buNone/>
+              <a:defRPr sz="3602"/>
             </a:lvl5pPr>
-            <a:lvl6pPr marL="3840251" indent="0">
-              <a:buNone/>
-              <a:defRPr sz="3360"/>
+            <a:lvl6pPr marL="4117543" indent="0">
+              <a:buNone/>
+              <a:defRPr sz="3602"/>
             </a:lvl6pPr>
-            <a:lvl7pPr marL="4608302" indent="0">
-              <a:buNone/>
-              <a:defRPr sz="3360"/>
+            <a:lvl7pPr marL="4941052" indent="0">
+              <a:buNone/>
+              <a:defRPr sz="3602"/>
             </a:lvl7pPr>
-            <a:lvl8pPr marL="5376352" indent="0">
-              <a:buNone/>
-              <a:defRPr sz="3360"/>
+            <a:lvl8pPr marL="5764560" indent="0">
+              <a:buNone/>
+              <a:defRPr sz="3602"/>
             </a:lvl8pPr>
-            <a:lvl9pPr marL="6144402" indent="0">
-              <a:buNone/>
-              <a:defRPr sz="3360"/>
+            <a:lvl9pPr marL="6588069" indent="0">
+              <a:buNone/>
+              <a:defRPr sz="3602"/>
             </a:lvl9pPr>
           </a:lstStyle>
           <a:p>
@@ -2296,8 +2733,8 @@
         </p:nvSpPr>
         <p:spPr>
           <a:xfrm>
-            <a:off x="1512603" y="3456146"/>
-            <a:ext cx="7082635" cy="6402939"/>
+            <a:off x="1512603" y="3888105"/>
+            <a:ext cx="7082635" cy="7203195"/>
           </a:xfrm>
         </p:spPr>
         <p:txBody>
@@ -2305,39 +2742,39 @@
           <a:lstStyle>
             <a:lvl1pPr marL="0" indent="0">
               <a:buNone/>
-              <a:defRPr sz="2688"/>
+              <a:defRPr sz="2882"/>
             </a:lvl1pPr>
-            <a:lvl2pPr marL="768050" indent="0">
-              <a:buNone/>
-              <a:defRPr sz="2352"/>
+            <a:lvl2pPr marL="823509" indent="0">
+              <a:buNone/>
+              <a:defRPr sz="2522"/>
             </a:lvl2pPr>
-            <a:lvl3pPr marL="1536101" indent="0">
-              <a:buNone/>
-              <a:defRPr sz="2016"/>
+            <a:lvl3pPr marL="1647017" indent="0">
+              <a:buNone/>
+              <a:defRPr sz="2161"/>
             </a:lvl3pPr>
-            <a:lvl4pPr marL="2304151" indent="0">
-              <a:buNone/>
-              <a:defRPr sz="1680"/>
+            <a:lvl4pPr marL="2470526" indent="0">
+              <a:buNone/>
+              <a:defRPr sz="1801"/>
             </a:lvl4pPr>
-            <a:lvl5pPr marL="3072201" indent="0">
-              <a:buNone/>
-              <a:defRPr sz="1680"/>
+            <a:lvl5pPr marL="3294035" indent="0">
+              <a:buNone/>
+              <a:defRPr sz="1801"/>
             </a:lvl5pPr>
-            <a:lvl6pPr marL="3840251" indent="0">
-              <a:buNone/>
-              <a:defRPr sz="1680"/>
+            <a:lvl6pPr marL="4117543" indent="0">
+              <a:buNone/>
+              <a:defRPr sz="1801"/>
             </a:lvl6pPr>
-            <a:lvl7pPr marL="4608302" indent="0">
-              <a:buNone/>
-              <a:defRPr sz="1680"/>
+            <a:lvl7pPr marL="4941052" indent="0">
+              <a:buNone/>
+              <a:defRPr sz="1801"/>
             </a:lvl7pPr>
-            <a:lvl8pPr marL="5376352" indent="0">
-              <a:buNone/>
-              <a:defRPr sz="1680"/>
+            <a:lvl8pPr marL="5764560" indent="0">
+              <a:buNone/>
+              <a:defRPr sz="1801"/>
             </a:lvl8pPr>
-            <a:lvl9pPr marL="6144402" indent="0">
-              <a:buNone/>
-              <a:defRPr sz="1680"/>
+            <a:lvl9pPr marL="6588069" indent="0">
+              <a:buNone/>
+              <a:defRPr sz="1801"/>
             </a:lvl9pPr>
           </a:lstStyle>
           <a:p>
@@ -2366,7 +2803,7 @@
           <a:p>
             <a:fld id="{70F68FBA-1141-104B-97C3-EBEB31FE0037}" type="datetimeFigureOut">
               <a:rPr lang="en-DE" smtClean="0"/>
-              <a:t>27.02.22</a:t>
+              <a:t>06.05.22</a:t>
             </a:fld>
             <a:endParaRPr lang="en-DE"/>
           </a:p>
@@ -2417,7 +2854,7 @@
     </p:spTree>
     <p:extLst>
       <p:ext uri="{BB962C8B-B14F-4D97-AF65-F5344CB8AC3E}">
-        <p14:creationId xmlns:p14="http://schemas.microsoft.com/office/powerpoint/2010/main" val="597649421"/>
+        <p14:creationId xmlns:p14="http://schemas.microsoft.com/office/powerpoint/2010/main" val="2951078990"/>
       </p:ext>
     </p:extLst>
   </p:cSld>
@@ -2461,8 +2898,8 @@
         </p:nvSpPr>
         <p:spPr>
           <a:xfrm>
-            <a:off x="1509743" y="613360"/>
-            <a:ext cx="18940403" cy="2226762"/>
+            <a:off x="1509743" y="690019"/>
+            <a:ext cx="18940403" cy="2505069"/>
           </a:xfrm>
           <a:prstGeom prst="rect">
             <a:avLst/>
@@ -2494,8 +2931,8 @@
         </p:nvSpPr>
         <p:spPr>
           <a:xfrm>
-            <a:off x="1509743" y="3066796"/>
-            <a:ext cx="18940403" cy="7309644"/>
+            <a:off x="1509743" y="3450093"/>
+            <a:ext cx="18940403" cy="8223223"/>
           </a:xfrm>
           <a:prstGeom prst="rect">
             <a:avLst/>
@@ -2556,8 +2993,8 @@
         </p:nvSpPr>
         <p:spPr>
           <a:xfrm>
-            <a:off x="1509742" y="10677787"/>
-            <a:ext cx="4940975" cy="613359"/>
+            <a:off x="1509742" y="12012325"/>
+            <a:ext cx="4940975" cy="690019"/>
           </a:xfrm>
           <a:prstGeom prst="rect">
             <a:avLst/>
@@ -2567,7 +3004,7 @@
           <a:bodyPr vert="horz" lIns="91440" tIns="45720" rIns="91440" bIns="45720" rtlCol="0" anchor="ctr"/>
           <a:lstStyle>
             <a:lvl1pPr algn="l">
-              <a:defRPr sz="2016">
+              <a:defRPr sz="2161">
                 <a:solidFill>
                   <a:schemeClr val="tx1">
                     <a:tint val="75000"/>
@@ -2579,7 +3016,7 @@
           <a:p>
             <a:fld id="{70F68FBA-1141-104B-97C3-EBEB31FE0037}" type="datetimeFigureOut">
               <a:rPr lang="en-DE" smtClean="0"/>
-              <a:t>27.02.22</a:t>
+              <a:t>06.05.22</a:t>
             </a:fld>
             <a:endParaRPr lang="en-DE"/>
           </a:p>
@@ -2597,8 +3034,8 @@
         </p:nvSpPr>
         <p:spPr>
           <a:xfrm>
-            <a:off x="7274213" y="10677787"/>
-            <a:ext cx="7411462" cy="613359"/>
+            <a:off x="7274213" y="12012325"/>
+            <a:ext cx="7411462" cy="690019"/>
           </a:xfrm>
           <a:prstGeom prst="rect">
             <a:avLst/>
@@ -2608,7 +3045,7 @@
           <a:bodyPr vert="horz" lIns="91440" tIns="45720" rIns="91440" bIns="45720" rtlCol="0" anchor="ctr"/>
           <a:lstStyle>
             <a:lvl1pPr algn="ctr">
-              <a:defRPr sz="2016">
+              <a:defRPr sz="2161">
                 <a:solidFill>
                   <a:schemeClr val="tx1">
                     <a:tint val="75000"/>
@@ -2634,8 +3071,8 @@
         </p:nvSpPr>
         <p:spPr>
           <a:xfrm>
-            <a:off x="15509171" y="10677787"/>
-            <a:ext cx="4940975" cy="613359"/>
+            <a:off x="15509171" y="12012325"/>
+            <a:ext cx="4940975" cy="690019"/>
           </a:xfrm>
           <a:prstGeom prst="rect">
             <a:avLst/>
@@ -2645,7 +3082,7 @@
           <a:bodyPr vert="horz" lIns="91440" tIns="45720" rIns="91440" bIns="45720" rtlCol="0" anchor="ctr"/>
           <a:lstStyle>
             <a:lvl1pPr algn="r">
-              <a:defRPr sz="2016">
+              <a:defRPr sz="2161">
                 <a:solidFill>
                   <a:schemeClr val="tx1">
                     <a:tint val="75000"/>
@@ -2666,27 +3103,27 @@
     </p:spTree>
     <p:extLst>
       <p:ext uri="{BB962C8B-B14F-4D97-AF65-F5344CB8AC3E}">
-        <p14:creationId xmlns:p14="http://schemas.microsoft.com/office/powerpoint/2010/main" val="1803166019"/>
+        <p14:creationId xmlns:p14="http://schemas.microsoft.com/office/powerpoint/2010/main" val="4106840972"/>
       </p:ext>
     </p:extLst>
   </p:cSld>
   <p:clrMap bg1="lt1" tx1="dk1" bg2="lt2" tx2="dk2" accent1="accent1" accent2="accent2" accent3="accent3" accent4="accent4" accent5="accent5" accent6="accent6" hlink="hlink" folHlink="folHlink"/>
   <p:sldLayoutIdLst>
-    <p:sldLayoutId id="2147483697" r:id="rId1"/>
-    <p:sldLayoutId id="2147483698" r:id="rId2"/>
-    <p:sldLayoutId id="2147483699" r:id="rId3"/>
-    <p:sldLayoutId id="2147483700" r:id="rId4"/>
-    <p:sldLayoutId id="2147483701" r:id="rId5"/>
-    <p:sldLayoutId id="2147483702" r:id="rId6"/>
-    <p:sldLayoutId id="2147483703" r:id="rId7"/>
-    <p:sldLayoutId id="2147483704" r:id="rId8"/>
-    <p:sldLayoutId id="2147483705" r:id="rId9"/>
-    <p:sldLayoutId id="2147483706" r:id="rId10"/>
-    <p:sldLayoutId id="2147483707" r:id="rId11"/>
+    <p:sldLayoutId id="2147483721" r:id="rId1"/>
+    <p:sldLayoutId id="2147483722" r:id="rId2"/>
+    <p:sldLayoutId id="2147483723" r:id="rId3"/>
+    <p:sldLayoutId id="2147483724" r:id="rId4"/>
+    <p:sldLayoutId id="2147483725" r:id="rId5"/>
+    <p:sldLayoutId id="2147483726" r:id="rId6"/>
+    <p:sldLayoutId id="2147483727" r:id="rId7"/>
+    <p:sldLayoutId id="2147483728" r:id="rId8"/>
+    <p:sldLayoutId id="2147483729" r:id="rId9"/>
+    <p:sldLayoutId id="2147483730" r:id="rId10"/>
+    <p:sldLayoutId id="2147483731" r:id="rId11"/>
   </p:sldLayoutIdLst>
   <p:txStyles>
     <p:titleStyle>
-      <a:lvl1pPr algn="l" defTabSz="1536101" rtl="0" eaLnBrk="1" latinLnBrk="0" hangingPunct="1">
+      <a:lvl1pPr algn="l" defTabSz="1647017" rtl="0" eaLnBrk="1" latinLnBrk="0" hangingPunct="1">
         <a:lnSpc>
           <a:spcPct val="90000"/>
         </a:lnSpc>
@@ -2694,7 +3131,7 @@
           <a:spcPct val="0"/>
         </a:spcBef>
         <a:buNone/>
-        <a:defRPr sz="7392" kern="1200">
+        <a:defRPr sz="7925" kern="1200">
           <a:solidFill>
             <a:schemeClr val="tx1"/>
           </a:solidFill>
@@ -2705,16 +3142,16 @@
       </a:lvl1pPr>
     </p:titleStyle>
     <p:bodyStyle>
-      <a:lvl1pPr marL="384025" indent="-384025" algn="l" defTabSz="1536101" rtl="0" eaLnBrk="1" latinLnBrk="0" hangingPunct="1">
+      <a:lvl1pPr marL="411754" indent="-411754" algn="l" defTabSz="1647017" rtl="0" eaLnBrk="1" latinLnBrk="0" hangingPunct="1">
         <a:lnSpc>
           <a:spcPct val="90000"/>
         </a:lnSpc>
         <a:spcBef>
-          <a:spcPts val="1680"/>
+          <a:spcPts val="1801"/>
         </a:spcBef>
         <a:buFont typeface="Arial" panose="020B0604020202020204" pitchFamily="34" charset="0"/>
         <a:buChar char="•"/>
-        <a:defRPr sz="4704" kern="1200">
+        <a:defRPr sz="5043" kern="1200">
           <a:solidFill>
             <a:schemeClr val="tx1"/>
           </a:solidFill>
@@ -2723,16 +3160,16 @@
           <a:cs typeface="+mn-cs"/>
         </a:defRPr>
       </a:lvl1pPr>
-      <a:lvl2pPr marL="1152075" indent="-384025" algn="l" defTabSz="1536101" rtl="0" eaLnBrk="1" latinLnBrk="0" hangingPunct="1">
+      <a:lvl2pPr marL="1235263" indent="-411754" algn="l" defTabSz="1647017" rtl="0" eaLnBrk="1" latinLnBrk="0" hangingPunct="1">
         <a:lnSpc>
           <a:spcPct val="90000"/>
         </a:lnSpc>
         <a:spcBef>
-          <a:spcPts val="840"/>
+          <a:spcPts val="901"/>
         </a:spcBef>
         <a:buFont typeface="Arial" panose="020B0604020202020204" pitchFamily="34" charset="0"/>
         <a:buChar char="•"/>
-        <a:defRPr sz="4032" kern="1200">
+        <a:defRPr sz="4323" kern="1200">
           <a:solidFill>
             <a:schemeClr val="tx1"/>
           </a:solidFill>
@@ -2741,16 +3178,16 @@
           <a:cs typeface="+mn-cs"/>
         </a:defRPr>
       </a:lvl2pPr>
-      <a:lvl3pPr marL="1920126" indent="-384025" algn="l" defTabSz="1536101" rtl="0" eaLnBrk="1" latinLnBrk="0" hangingPunct="1">
+      <a:lvl3pPr marL="2058772" indent="-411754" algn="l" defTabSz="1647017" rtl="0" eaLnBrk="1" latinLnBrk="0" hangingPunct="1">
         <a:lnSpc>
           <a:spcPct val="90000"/>
         </a:lnSpc>
         <a:spcBef>
-          <a:spcPts val="840"/>
+          <a:spcPts val="901"/>
         </a:spcBef>
         <a:buFont typeface="Arial" panose="020B0604020202020204" pitchFamily="34" charset="0"/>
         <a:buChar char="•"/>
-        <a:defRPr sz="3360" kern="1200">
+        <a:defRPr sz="3602" kern="1200">
           <a:solidFill>
             <a:schemeClr val="tx1"/>
           </a:solidFill>
@@ -2759,16 +3196,16 @@
           <a:cs typeface="+mn-cs"/>
         </a:defRPr>
       </a:lvl3pPr>
-      <a:lvl4pPr marL="2688176" indent="-384025" algn="l" defTabSz="1536101" rtl="0" eaLnBrk="1" latinLnBrk="0" hangingPunct="1">
+      <a:lvl4pPr marL="2882280" indent="-411754" algn="l" defTabSz="1647017" rtl="0" eaLnBrk="1" latinLnBrk="0" hangingPunct="1">
         <a:lnSpc>
           <a:spcPct val="90000"/>
         </a:lnSpc>
         <a:spcBef>
-          <a:spcPts val="840"/>
+          <a:spcPts val="901"/>
         </a:spcBef>
         <a:buFont typeface="Arial" panose="020B0604020202020204" pitchFamily="34" charset="0"/>
         <a:buChar char="•"/>
-        <a:defRPr sz="3024" kern="1200">
+        <a:defRPr sz="3242" kern="1200">
           <a:solidFill>
             <a:schemeClr val="tx1"/>
           </a:solidFill>
@@ -2777,16 +3214,16 @@
           <a:cs typeface="+mn-cs"/>
         </a:defRPr>
       </a:lvl4pPr>
-      <a:lvl5pPr marL="3456226" indent="-384025" algn="l" defTabSz="1536101" rtl="0" eaLnBrk="1" latinLnBrk="0" hangingPunct="1">
+      <a:lvl5pPr marL="3705789" indent="-411754" algn="l" defTabSz="1647017" rtl="0" eaLnBrk="1" latinLnBrk="0" hangingPunct="1">
         <a:lnSpc>
           <a:spcPct val="90000"/>
         </a:lnSpc>
         <a:spcBef>
-          <a:spcPts val="840"/>
+          <a:spcPts val="901"/>
         </a:spcBef>
         <a:buFont typeface="Arial" panose="020B0604020202020204" pitchFamily="34" charset="0"/>
         <a:buChar char="•"/>
-        <a:defRPr sz="3024" kern="1200">
+        <a:defRPr sz="3242" kern="1200">
           <a:solidFill>
             <a:schemeClr val="tx1"/>
           </a:solidFill>
@@ -2795,16 +3232,16 @@
           <a:cs typeface="+mn-cs"/>
         </a:defRPr>
       </a:lvl5pPr>
-      <a:lvl6pPr marL="4224277" indent="-384025" algn="l" defTabSz="1536101" rtl="0" eaLnBrk="1" latinLnBrk="0" hangingPunct="1">
+      <a:lvl6pPr marL="4529298" indent="-411754" algn="l" defTabSz="1647017" rtl="0" eaLnBrk="1" latinLnBrk="0" hangingPunct="1">
         <a:lnSpc>
           <a:spcPct val="90000"/>
         </a:lnSpc>
         <a:spcBef>
-          <a:spcPts val="840"/>
+          <a:spcPts val="901"/>
         </a:spcBef>
         <a:buFont typeface="Arial" panose="020B0604020202020204" pitchFamily="34" charset="0"/>
         <a:buChar char="•"/>
-        <a:defRPr sz="3024" kern="1200">
+        <a:defRPr sz="3242" kern="1200">
           <a:solidFill>
             <a:schemeClr val="tx1"/>
           </a:solidFill>
@@ -2813,16 +3250,16 @@
           <a:cs typeface="+mn-cs"/>
         </a:defRPr>
       </a:lvl6pPr>
-      <a:lvl7pPr marL="4992327" indent="-384025" algn="l" defTabSz="1536101" rtl="0" eaLnBrk="1" latinLnBrk="0" hangingPunct="1">
+      <a:lvl7pPr marL="5352806" indent="-411754" algn="l" defTabSz="1647017" rtl="0" eaLnBrk="1" latinLnBrk="0" hangingPunct="1">
         <a:lnSpc>
           <a:spcPct val="90000"/>
         </a:lnSpc>
         <a:spcBef>
-          <a:spcPts val="840"/>
+          <a:spcPts val="901"/>
         </a:spcBef>
         <a:buFont typeface="Arial" panose="020B0604020202020204" pitchFamily="34" charset="0"/>
         <a:buChar char="•"/>
-        <a:defRPr sz="3024" kern="1200">
+        <a:defRPr sz="3242" kern="1200">
           <a:solidFill>
             <a:schemeClr val="tx1"/>
           </a:solidFill>
@@ -2831,16 +3268,16 @@
           <a:cs typeface="+mn-cs"/>
         </a:defRPr>
       </a:lvl7pPr>
-      <a:lvl8pPr marL="5760377" indent="-384025" algn="l" defTabSz="1536101" rtl="0" eaLnBrk="1" latinLnBrk="0" hangingPunct="1">
+      <a:lvl8pPr marL="6176315" indent="-411754" algn="l" defTabSz="1647017" rtl="0" eaLnBrk="1" latinLnBrk="0" hangingPunct="1">
         <a:lnSpc>
           <a:spcPct val="90000"/>
         </a:lnSpc>
         <a:spcBef>
-          <a:spcPts val="840"/>
+          <a:spcPts val="901"/>
         </a:spcBef>
         <a:buFont typeface="Arial" panose="020B0604020202020204" pitchFamily="34" charset="0"/>
         <a:buChar char="•"/>
-        <a:defRPr sz="3024" kern="1200">
+        <a:defRPr sz="3242" kern="1200">
           <a:solidFill>
             <a:schemeClr val="tx1"/>
           </a:solidFill>
@@ -2849,16 +3286,16 @@
           <a:cs typeface="+mn-cs"/>
         </a:defRPr>
       </a:lvl8pPr>
-      <a:lvl9pPr marL="6528427" indent="-384025" algn="l" defTabSz="1536101" rtl="0" eaLnBrk="1" latinLnBrk="0" hangingPunct="1">
+      <a:lvl9pPr marL="6999823" indent="-411754" algn="l" defTabSz="1647017" rtl="0" eaLnBrk="1" latinLnBrk="0" hangingPunct="1">
         <a:lnSpc>
           <a:spcPct val="90000"/>
         </a:lnSpc>
         <a:spcBef>
-          <a:spcPts val="840"/>
+          <a:spcPts val="901"/>
         </a:spcBef>
         <a:buFont typeface="Arial" panose="020B0604020202020204" pitchFamily="34" charset="0"/>
         <a:buChar char="•"/>
-        <a:defRPr sz="3024" kern="1200">
+        <a:defRPr sz="3242" kern="1200">
           <a:solidFill>
             <a:schemeClr val="tx1"/>
           </a:solidFill>
@@ -2872,8 +3309,8 @@
       <a:defPPr>
         <a:defRPr lang="en-US"/>
       </a:defPPr>
-      <a:lvl1pPr marL="0" algn="l" defTabSz="1536101" rtl="0" eaLnBrk="1" latinLnBrk="0" hangingPunct="1">
-        <a:defRPr sz="3024" kern="1200">
+      <a:lvl1pPr marL="0" algn="l" defTabSz="1647017" rtl="0" eaLnBrk="1" latinLnBrk="0" hangingPunct="1">
+        <a:defRPr sz="3242" kern="1200">
           <a:solidFill>
             <a:schemeClr val="tx1"/>
           </a:solidFill>
@@ -2882,8 +3319,8 @@
           <a:cs typeface="+mn-cs"/>
         </a:defRPr>
       </a:lvl1pPr>
-      <a:lvl2pPr marL="768050" algn="l" defTabSz="1536101" rtl="0" eaLnBrk="1" latinLnBrk="0" hangingPunct="1">
-        <a:defRPr sz="3024" kern="1200">
+      <a:lvl2pPr marL="823509" algn="l" defTabSz="1647017" rtl="0" eaLnBrk="1" latinLnBrk="0" hangingPunct="1">
+        <a:defRPr sz="3242" kern="1200">
           <a:solidFill>
             <a:schemeClr val="tx1"/>
           </a:solidFill>
@@ -2892,8 +3329,8 @@
           <a:cs typeface="+mn-cs"/>
         </a:defRPr>
       </a:lvl2pPr>
-      <a:lvl3pPr marL="1536101" algn="l" defTabSz="1536101" rtl="0" eaLnBrk="1" latinLnBrk="0" hangingPunct="1">
-        <a:defRPr sz="3024" kern="1200">
+      <a:lvl3pPr marL="1647017" algn="l" defTabSz="1647017" rtl="0" eaLnBrk="1" latinLnBrk="0" hangingPunct="1">
+        <a:defRPr sz="3242" kern="1200">
           <a:solidFill>
             <a:schemeClr val="tx1"/>
           </a:solidFill>
@@ -2902,8 +3339,8 @@
           <a:cs typeface="+mn-cs"/>
         </a:defRPr>
       </a:lvl3pPr>
-      <a:lvl4pPr marL="2304151" algn="l" defTabSz="1536101" rtl="0" eaLnBrk="1" latinLnBrk="0" hangingPunct="1">
-        <a:defRPr sz="3024" kern="1200">
+      <a:lvl4pPr marL="2470526" algn="l" defTabSz="1647017" rtl="0" eaLnBrk="1" latinLnBrk="0" hangingPunct="1">
+        <a:defRPr sz="3242" kern="1200">
           <a:solidFill>
             <a:schemeClr val="tx1"/>
           </a:solidFill>
@@ -2912,8 +3349,8 @@
           <a:cs typeface="+mn-cs"/>
         </a:defRPr>
       </a:lvl4pPr>
-      <a:lvl5pPr marL="3072201" algn="l" defTabSz="1536101" rtl="0" eaLnBrk="1" latinLnBrk="0" hangingPunct="1">
-        <a:defRPr sz="3024" kern="1200">
+      <a:lvl5pPr marL="3294035" algn="l" defTabSz="1647017" rtl="0" eaLnBrk="1" latinLnBrk="0" hangingPunct="1">
+        <a:defRPr sz="3242" kern="1200">
           <a:solidFill>
             <a:schemeClr val="tx1"/>
           </a:solidFill>
@@ -2922,8 +3359,8 @@
           <a:cs typeface="+mn-cs"/>
         </a:defRPr>
       </a:lvl5pPr>
-      <a:lvl6pPr marL="3840251" algn="l" defTabSz="1536101" rtl="0" eaLnBrk="1" latinLnBrk="0" hangingPunct="1">
-        <a:defRPr sz="3024" kern="1200">
+      <a:lvl6pPr marL="4117543" algn="l" defTabSz="1647017" rtl="0" eaLnBrk="1" latinLnBrk="0" hangingPunct="1">
+        <a:defRPr sz="3242" kern="1200">
           <a:solidFill>
             <a:schemeClr val="tx1"/>
           </a:solidFill>
@@ -2932,8 +3369,8 @@
           <a:cs typeface="+mn-cs"/>
         </a:defRPr>
       </a:lvl6pPr>
-      <a:lvl7pPr marL="4608302" algn="l" defTabSz="1536101" rtl="0" eaLnBrk="1" latinLnBrk="0" hangingPunct="1">
-        <a:defRPr sz="3024" kern="1200">
+      <a:lvl7pPr marL="4941052" algn="l" defTabSz="1647017" rtl="0" eaLnBrk="1" latinLnBrk="0" hangingPunct="1">
+        <a:defRPr sz="3242" kern="1200">
           <a:solidFill>
             <a:schemeClr val="tx1"/>
           </a:solidFill>
@@ -2942,8 +3379,8 @@
           <a:cs typeface="+mn-cs"/>
         </a:defRPr>
       </a:lvl7pPr>
-      <a:lvl8pPr marL="5376352" algn="l" defTabSz="1536101" rtl="0" eaLnBrk="1" latinLnBrk="0" hangingPunct="1">
-        <a:defRPr sz="3024" kern="1200">
+      <a:lvl8pPr marL="5764560" algn="l" defTabSz="1647017" rtl="0" eaLnBrk="1" latinLnBrk="0" hangingPunct="1">
+        <a:defRPr sz="3242" kern="1200">
           <a:solidFill>
             <a:schemeClr val="tx1"/>
           </a:solidFill>
@@ -2952,8 +3389,8 @@
           <a:cs typeface="+mn-cs"/>
         </a:defRPr>
       </a:lvl8pPr>
-      <a:lvl9pPr marL="6144402" algn="l" defTabSz="1536101" rtl="0" eaLnBrk="1" latinLnBrk="0" hangingPunct="1">
-        <a:defRPr sz="3024" kern="1200">
+      <a:lvl9pPr marL="6588069" algn="l" defTabSz="1647017" rtl="0" eaLnBrk="1" latinLnBrk="0" hangingPunct="1">
+        <a:defRPr sz="3242" kern="1200">
           <a:solidFill>
             <a:schemeClr val="tx1"/>
           </a:solidFill>
@@ -2998,7 +3435,7 @@
         </p:nvSpPr>
         <p:spPr>
           <a:xfrm>
-            <a:off x="2098427" y="494833"/>
+            <a:off x="2102023" y="410094"/>
             <a:ext cx="3689024" cy="2111637"/>
           </a:xfrm>
           <a:prstGeom prst="roundRect">
@@ -3158,7 +3595,7 @@
         </p:nvSpPr>
         <p:spPr>
           <a:xfrm>
-            <a:off x="6228009" y="1061552"/>
+            <a:off x="6231607" y="976811"/>
             <a:ext cx="3700493" cy="978200"/>
           </a:xfrm>
           <a:prstGeom prst="roundRect">
@@ -3235,7 +3672,7 @@
         </p:nvSpPr>
         <p:spPr>
           <a:xfrm>
-            <a:off x="2098426" y="3034048"/>
+            <a:off x="2102022" y="2949309"/>
             <a:ext cx="3689024" cy="770433"/>
           </a:xfrm>
           <a:prstGeom prst="roundRect">
@@ -3326,7 +3763,7 @@
         </p:nvSpPr>
         <p:spPr>
           <a:xfrm>
-            <a:off x="2098419" y="4232058"/>
+            <a:off x="2102015" y="4147319"/>
             <a:ext cx="3689024" cy="770433"/>
           </a:xfrm>
           <a:prstGeom prst="roundRect">
@@ -3417,7 +3854,7 @@
         </p:nvSpPr>
         <p:spPr>
           <a:xfrm>
-            <a:off x="6228011" y="3034048"/>
+            <a:off x="6231609" y="2949309"/>
             <a:ext cx="3700493" cy="770433"/>
           </a:xfrm>
           <a:prstGeom prst="roundRect">
@@ -3492,7 +3929,7 @@
         </p:nvSpPr>
         <p:spPr>
           <a:xfrm>
-            <a:off x="6228010" y="4232058"/>
+            <a:off x="6231606" y="4147319"/>
             <a:ext cx="3689014" cy="770433"/>
           </a:xfrm>
           <a:prstGeom prst="roundRect">
@@ -3567,7 +4004,7 @@
         </p:nvSpPr>
         <p:spPr>
           <a:xfrm>
-            <a:off x="2098420" y="5424138"/>
+            <a:off x="2102016" y="5339399"/>
             <a:ext cx="3689022" cy="770433"/>
           </a:xfrm>
           <a:prstGeom prst="roundRect">
@@ -3650,7 +4087,7 @@
         </p:nvSpPr>
         <p:spPr>
           <a:xfrm>
-            <a:off x="6216531" y="5424138"/>
+            <a:off x="6220129" y="5339397"/>
             <a:ext cx="3700493" cy="2657166"/>
           </a:xfrm>
           <a:prstGeom prst="roundRect">
@@ -3774,21 +4211,11 @@
                 <a:latin typeface="Arial" panose="020B0604020202020204" pitchFamily="34" charset="0"/>
                 <a:cs typeface="Arial" panose="020B0604020202020204" pitchFamily="34" charset="0"/>
               </a:rPr>
-              <a:t>No temporal synchrony (n = </a:t>
-            </a:r>
-            <a:r>
-              <a:rPr lang="en-DE" sz="1746" dirty="0">
-                <a:solidFill>
-                  <a:schemeClr val="bg2"/>
-                </a:solidFill>
-                <a:highlight>
-                  <a:srgbClr val="FF0000"/>
-                </a:highlight>
-                <a:latin typeface="Arial" panose="020B0604020202020204" pitchFamily="34" charset="0"/>
-                <a:cs typeface="Arial" panose="020B0604020202020204" pitchFamily="34" charset="0"/>
-              </a:rPr>
-              <a:t>43</a:t>
-            </a:r>
+              <a:t>No temporal synchrony (n = 43)</a:t>
+            </a:r>
+          </a:p>
+          <a:p>
+            <a:pPr marL="346994" indent="-174564"/>
             <a:r>
               <a:rPr lang="en-DE" sz="1746" dirty="0">
                 <a:solidFill>
@@ -3797,43 +4224,7 @@
                 <a:latin typeface="Arial" panose="020B0604020202020204" pitchFamily="34" charset="0"/>
                 <a:cs typeface="Arial" panose="020B0604020202020204" pitchFamily="34" charset="0"/>
               </a:rPr>
-              <a:t>)</a:t>
-            </a:r>
-          </a:p>
-          <a:p>
-            <a:pPr marL="346994" indent="-174564"/>
-            <a:r>
-              <a:rPr lang="en-DE" sz="1746" dirty="0">
-                <a:solidFill>
-                  <a:schemeClr val="bg2"/>
-                </a:solidFill>
-                <a:latin typeface="Arial" panose="020B0604020202020204" pitchFamily="34" charset="0"/>
-                <a:cs typeface="Arial" panose="020B0604020202020204" pitchFamily="34" charset="0"/>
-              </a:rPr>
-              <a:t>Not whole-brain / channel-wise / data not available (n = </a:t>
-            </a:r>
-            <a:r>
-              <a:rPr lang="en-DE" sz="1746" dirty="0">
-                <a:solidFill>
-                  <a:schemeClr val="bg2"/>
-                </a:solidFill>
-                <a:highlight>
-                  <a:srgbClr val="FF0000"/>
-                </a:highlight>
-                <a:latin typeface="Arial" panose="020B0604020202020204" pitchFamily="34" charset="0"/>
-                <a:cs typeface="Arial" panose="020B0604020202020204" pitchFamily="34" charset="0"/>
-              </a:rPr>
-              <a:t>49</a:t>
-            </a:r>
-            <a:r>
-              <a:rPr lang="en-DE" sz="1746" dirty="0">
-                <a:solidFill>
-                  <a:schemeClr val="bg2"/>
-                </a:solidFill>
-                <a:latin typeface="Arial" panose="020B0604020202020204" pitchFamily="34" charset="0"/>
-                <a:cs typeface="Arial" panose="020B0604020202020204" pitchFamily="34" charset="0"/>
-              </a:rPr>
-              <a:t>)</a:t>
+              <a:t>Not whole-brain / channel-wise / data not available (n = 55)</a:t>
             </a:r>
           </a:p>
         </p:txBody>
@@ -3852,7 +4243,7 @@
         </p:nvSpPr>
         <p:spPr>
           <a:xfrm>
-            <a:off x="2098419" y="8509045"/>
+            <a:off x="2102015" y="8424304"/>
             <a:ext cx="3689022" cy="1034012"/>
           </a:xfrm>
           <a:prstGeom prst="roundRect">
@@ -3923,32 +4314,7 @@
                 <a:cs typeface="Arial" panose="020B0604020202020204" pitchFamily="34" charset="0"/>
                 <a:sym typeface="Wingdings" pitchFamily="2" charset="2"/>
               </a:rPr>
-              <a:t>fNIRS (n = </a:t>
-            </a:r>
-            <a:r>
-              <a:rPr lang="en-DE" sz="1746" dirty="0">
-                <a:solidFill>
-                  <a:schemeClr val="bg2"/>
-                </a:solidFill>
-                <a:highlight>
-                  <a:srgbClr val="FF0000"/>
-                </a:highlight>
-                <a:latin typeface="Arial" panose="020B0604020202020204" pitchFamily="34" charset="0"/>
-                <a:cs typeface="Arial" panose="020B0604020202020204" pitchFamily="34" charset="0"/>
-                <a:sym typeface="Wingdings" pitchFamily="2" charset="2"/>
-              </a:rPr>
-              <a:t>XX</a:t>
-            </a:r>
-            <a:r>
-              <a:rPr lang="en-DE" sz="1746" dirty="0">
-                <a:solidFill>
-                  <a:schemeClr val="bg2"/>
-                </a:solidFill>
-                <a:latin typeface="Arial" panose="020B0604020202020204" pitchFamily="34" charset="0"/>
-                <a:cs typeface="Arial" panose="020B0604020202020204" pitchFamily="34" charset="0"/>
-                <a:sym typeface="Wingdings" pitchFamily="2" charset="2"/>
-              </a:rPr>
-              <a:t>)</a:t>
+              <a:t>fNIRS (n = 57)</a:t>
             </a:r>
             <a:endParaRPr lang="en-DE" sz="1746" dirty="0">
               <a:solidFill>
@@ -3974,7 +4340,7 @@
         </p:nvSpPr>
         <p:spPr>
           <a:xfrm>
-            <a:off x="2098419" y="9983630"/>
+            <a:off x="2102015" y="9898889"/>
             <a:ext cx="3689022" cy="1034012"/>
           </a:xfrm>
           <a:prstGeom prst="roundRect">
@@ -4045,32 +4411,7 @@
                 <a:cs typeface="Arial" panose="020B0604020202020204" pitchFamily="34" charset="0"/>
                 <a:sym typeface="Wingdings" pitchFamily="2" charset="2"/>
               </a:rPr>
-              <a:t>fNIRS (n = </a:t>
-            </a:r>
-            <a:r>
-              <a:rPr lang="en-DE" sz="1746" dirty="0">
-                <a:solidFill>
-                  <a:schemeClr val="bg2"/>
-                </a:solidFill>
-                <a:highlight>
-                  <a:srgbClr val="FF0000"/>
-                </a:highlight>
-                <a:latin typeface="Arial" panose="020B0604020202020204" pitchFamily="34" charset="0"/>
-                <a:cs typeface="Arial" panose="020B0604020202020204" pitchFamily="34" charset="0"/>
-                <a:sym typeface="Wingdings" pitchFamily="2" charset="2"/>
-              </a:rPr>
-              <a:t>XX</a:t>
-            </a:r>
-            <a:r>
-              <a:rPr lang="en-DE" sz="1746" dirty="0">
-                <a:solidFill>
-                  <a:schemeClr val="bg2"/>
-                </a:solidFill>
-                <a:latin typeface="Arial" panose="020B0604020202020204" pitchFamily="34" charset="0"/>
-                <a:cs typeface="Arial" panose="020B0604020202020204" pitchFamily="34" charset="0"/>
-                <a:sym typeface="Wingdings" pitchFamily="2" charset="2"/>
-              </a:rPr>
-              <a:t>)</a:t>
+              <a:t>fNIRS (n = 69)</a:t>
             </a:r>
             <a:endParaRPr lang="en-DE" sz="1746" dirty="0">
               <a:solidFill>
@@ -4096,7 +4437,7 @@
         </p:nvSpPr>
         <p:spPr>
           <a:xfrm>
-            <a:off x="3729457" y="2593478"/>
+            <a:off x="3733053" y="2508739"/>
             <a:ext cx="426958" cy="440573"/>
           </a:xfrm>
           <a:prstGeom prst="downArrow">
@@ -4150,7 +4491,7 @@
         </p:nvSpPr>
         <p:spPr>
           <a:xfrm>
-            <a:off x="3729449" y="6189191"/>
+            <a:off x="3733045" y="6104450"/>
             <a:ext cx="426958" cy="2319854"/>
           </a:xfrm>
           <a:prstGeom prst="downArrow">
@@ -4204,7 +4545,7 @@
         </p:nvSpPr>
         <p:spPr>
           <a:xfrm rot="16200000">
-            <a:off x="312192" y="1282441"/>
+            <a:off x="315788" y="1197702"/>
             <a:ext cx="2098644" cy="523427"/>
           </a:xfrm>
           <a:prstGeom prst="roundRect">
@@ -4279,7 +4620,7 @@
         </p:nvSpPr>
         <p:spPr>
           <a:xfrm rot="16200000">
-            <a:off x="-1162116" y="5295962"/>
+            <a:off x="-1158520" y="5211223"/>
             <a:ext cx="5047256" cy="523427"/>
           </a:xfrm>
           <a:prstGeom prst="roundRect">
@@ -4354,7 +4695,7 @@
         </p:nvSpPr>
         <p:spPr>
           <a:xfrm rot="16200000">
-            <a:off x="107211" y="9501630"/>
+            <a:off x="110807" y="9416891"/>
             <a:ext cx="2508598" cy="523427"/>
           </a:xfrm>
           <a:prstGeom prst="roundRect">
@@ -4400,7 +4741,7 @@
                 <a:latin typeface="Arial" panose="020B0604020202020204" pitchFamily="34" charset="0"/>
                 <a:cs typeface="Arial" panose="020B0604020202020204" pitchFamily="34" charset="0"/>
               </a:rPr>
-              <a:t>Included</a:t>
+              <a:t>Inclusion</a:t>
             </a:r>
             <a:endParaRPr lang="en-DE" sz="1940" b="1" dirty="0">
               <a:solidFill>
@@ -4429,7 +4770,7 @@
         </p:nvSpPr>
         <p:spPr>
           <a:xfrm rot="16200000">
-            <a:off x="5794248" y="1330366"/>
+            <a:off x="5797844" y="1245627"/>
             <a:ext cx="426958" cy="440573"/>
           </a:xfrm>
           <a:prstGeom prst="downArrow">
@@ -4483,7 +4824,7 @@
         </p:nvSpPr>
         <p:spPr>
           <a:xfrm rot="16200000">
-            <a:off x="5794248" y="4396990"/>
+            <a:off x="5797844" y="4312251"/>
             <a:ext cx="426958" cy="440573"/>
           </a:xfrm>
           <a:prstGeom prst="downArrow">
@@ -4537,7 +4878,7 @@
         </p:nvSpPr>
         <p:spPr>
           <a:xfrm>
-            <a:off x="3729449" y="3804600"/>
+            <a:off x="3733045" y="3719861"/>
             <a:ext cx="426958" cy="440573"/>
           </a:xfrm>
           <a:prstGeom prst="downArrow">
@@ -4591,7 +4932,7 @@
         </p:nvSpPr>
         <p:spPr>
           <a:xfrm>
-            <a:off x="3729449" y="4997860"/>
+            <a:off x="3733045" y="4913121"/>
             <a:ext cx="426958" cy="440573"/>
           </a:xfrm>
           <a:prstGeom prst="downArrow">
@@ -4645,7 +4986,7 @@
         </p:nvSpPr>
         <p:spPr>
           <a:xfrm>
-            <a:off x="3729447" y="9543060"/>
+            <a:off x="3733043" y="9458321"/>
             <a:ext cx="426958" cy="440573"/>
           </a:xfrm>
           <a:prstGeom prst="downArrow">
@@ -4699,7 +5040,7 @@
         </p:nvSpPr>
         <p:spPr>
           <a:xfrm rot="16200000">
-            <a:off x="5794243" y="5594999"/>
+            <a:off x="5797839" y="5510260"/>
             <a:ext cx="426958" cy="440573"/>
           </a:xfrm>
           <a:prstGeom prst="downArrow">
@@ -4753,7 +5094,7 @@
         </p:nvSpPr>
         <p:spPr>
           <a:xfrm rot="16200000">
-            <a:off x="5800090" y="3195261"/>
+            <a:off x="5803686" y="3110522"/>
             <a:ext cx="426958" cy="440573"/>
           </a:xfrm>
           <a:prstGeom prst="downArrow">
@@ -4807,7 +5148,7 @@
         </p:nvSpPr>
         <p:spPr>
           <a:xfrm>
-            <a:off x="269740" y="214406"/>
+            <a:off x="182864" y="192744"/>
             <a:ext cx="621286" cy="895444"/>
           </a:xfrm>
           <a:prstGeom prst="rect">
@@ -4846,14 +5187,14 @@
           <p:nvPr/>
         </p:nvPicPr>
         <p:blipFill>
-          <a:blip r:embed="rId2"/>
-          <a:srcRect l="18494" r="18494"/>
+          <a:blip r:embed="rId3"/>
+          <a:srcRect l="20389" r="20389"/>
           <a:stretch/>
         </p:blipFill>
         <p:spPr>
           <a:xfrm>
-            <a:off x="10104559" y="0"/>
-            <a:ext cx="11855329" cy="11067469"/>
+            <a:off x="9158792" y="132839"/>
+            <a:ext cx="13897382" cy="12973815"/>
           </a:xfrm>
           <a:prstGeom prst="rect">
             <a:avLst/>
@@ -4874,7 +5215,7 @@
         </p:nvSpPr>
         <p:spPr>
           <a:xfrm>
-            <a:off x="11233967" y="214406"/>
+            <a:off x="11154311" y="200501"/>
             <a:ext cx="621286" cy="895444"/>
           </a:xfrm>
           <a:prstGeom prst="rect">
@@ -4895,6 +5236,246 @@
               </a:rPr>
               <a:t>B</a:t>
             </a:r>
+          </a:p>
+        </p:txBody>
+      </p:sp>
+      <p:sp>
+        <p:nvSpPr>
+          <p:cNvPr id="28" name="Down Arrow 27">
+            <a:extLst>
+              <a:ext uri="{FF2B5EF4-FFF2-40B4-BE49-F238E27FC236}">
+                <a16:creationId xmlns:a16="http://schemas.microsoft.com/office/drawing/2014/main" id="{497E76D3-9DD9-17CA-BA5C-64C84D3B823A}"/>
+              </a:ext>
+            </a:extLst>
+          </p:cNvPr>
+          <p:cNvSpPr/>
+          <p:nvPr/>
+        </p:nvSpPr>
+        <p:spPr>
+          <a:xfrm>
+            <a:off x="3733043" y="10932899"/>
+            <a:ext cx="426958" cy="440573"/>
+          </a:xfrm>
+          <a:prstGeom prst="downArrow">
+            <a:avLst/>
+          </a:prstGeom>
+          <a:solidFill>
+            <a:schemeClr val="accent1">
+              <a:lumMod val="50000"/>
+            </a:schemeClr>
+          </a:solidFill>
+          <a:ln>
+            <a:noFill/>
+          </a:ln>
+        </p:spPr>
+        <p:style>
+          <a:lnRef idx="2">
+            <a:schemeClr val="accent1">
+              <a:shade val="50000"/>
+            </a:schemeClr>
+          </a:lnRef>
+          <a:fillRef idx="1">
+            <a:schemeClr val="accent1"/>
+          </a:fillRef>
+          <a:effectRef idx="0">
+            <a:schemeClr val="accent1"/>
+          </a:effectRef>
+          <a:fontRef idx="minor">
+            <a:schemeClr val="lt1"/>
+          </a:fontRef>
+        </p:style>
+        <p:txBody>
+          <a:bodyPr rtlCol="0" anchor="ctr"/>
+          <a:lstStyle/>
+          <a:p>
+            <a:pPr algn="ctr"/>
+            <a:endParaRPr lang="en-DE" sz="1746"/>
+          </a:p>
+        </p:txBody>
+      </p:sp>
+      <p:sp>
+        <p:nvSpPr>
+          <p:cNvPr id="29" name="Rounded Rectangle 28">
+            <a:extLst>
+              <a:ext uri="{FF2B5EF4-FFF2-40B4-BE49-F238E27FC236}">
+                <a16:creationId xmlns:a16="http://schemas.microsoft.com/office/drawing/2014/main" id="{52A89911-B7C8-621E-68FD-DEE116378ED4}"/>
+              </a:ext>
+            </a:extLst>
+          </p:cNvPr>
+          <p:cNvSpPr/>
+          <p:nvPr/>
+        </p:nvSpPr>
+        <p:spPr>
+          <a:xfrm>
+            <a:off x="2102014" y="11373469"/>
+            <a:ext cx="7818606" cy="1281924"/>
+          </a:xfrm>
+          <a:prstGeom prst="roundRect">
+            <a:avLst/>
+          </a:prstGeom>
+          <a:solidFill>
+            <a:schemeClr val="accent1">
+              <a:lumMod val="50000"/>
+            </a:schemeClr>
+          </a:solidFill>
+          <a:ln w="63500">
+            <a:noFill/>
+          </a:ln>
+        </p:spPr>
+        <p:style>
+          <a:lnRef idx="2">
+            <a:schemeClr val="accent1">
+              <a:shade val="50000"/>
+            </a:schemeClr>
+          </a:lnRef>
+          <a:fillRef idx="1">
+            <a:schemeClr val="accent1"/>
+          </a:fillRef>
+          <a:effectRef idx="0">
+            <a:schemeClr val="accent1"/>
+          </a:effectRef>
+          <a:fontRef idx="minor">
+            <a:schemeClr val="lt1"/>
+          </a:fontRef>
+        </p:style>
+        <p:txBody>
+          <a:bodyPr rtlCol="0" anchor="ctr"/>
+          <a:lstStyle/>
+          <a:p>
+            <a:r>
+              <a:rPr lang="en-GB" sz="1746" b="1" dirty="0">
+                <a:solidFill>
+                  <a:schemeClr val="bg2"/>
+                </a:solidFill>
+                <a:latin typeface="Arial" panose="020B0604020202020204" pitchFamily="34" charset="0"/>
+                <a:cs typeface="Arial" panose="020B0604020202020204" pitchFamily="34" charset="0"/>
+              </a:rPr>
+              <a:t>Experiments analyzed</a:t>
+            </a:r>
+          </a:p>
+          <a:p>
+            <a:pPr marL="177050"/>
+            <a:r>
+              <a:rPr lang="en-DE" sz="1746" dirty="0">
+                <a:solidFill>
+                  <a:schemeClr val="bg2"/>
+                </a:solidFill>
+                <a:latin typeface="Arial" panose="020B0604020202020204" pitchFamily="34" charset="0"/>
+                <a:cs typeface="Arial" panose="020B0604020202020204" pitchFamily="34" charset="0"/>
+                <a:sym typeface="Wingdings" pitchFamily="2" charset="2"/>
+              </a:rPr>
+              <a:t>fMRI: Primary Activation Likelihood Estimation (n = 22)</a:t>
+            </a:r>
+          </a:p>
+          <a:p>
+            <a:pPr marL="177050"/>
+            <a:r>
+              <a:rPr lang="en-DE" sz="1746" dirty="0">
+                <a:solidFill>
+                  <a:schemeClr val="bg2"/>
+                </a:solidFill>
+                <a:latin typeface="Arial" panose="020B0604020202020204" pitchFamily="34" charset="0"/>
+                <a:cs typeface="Arial" panose="020B0604020202020204" pitchFamily="34" charset="0"/>
+                <a:sym typeface="Wingdings" pitchFamily="2" charset="2"/>
+              </a:rPr>
+              <a:t>fNIRS: Primary parcel-wise quantitative analysis (n = 69)</a:t>
+            </a:r>
+          </a:p>
+          <a:p>
+            <a:pPr marL="177050"/>
+            <a:r>
+              <a:rPr lang="en-DE" sz="1746" dirty="0">
+                <a:solidFill>
+                  <a:schemeClr val="bg2"/>
+                </a:solidFill>
+                <a:latin typeface="Arial" panose="020B0604020202020204" pitchFamily="34" charset="0"/>
+                <a:cs typeface="Arial" panose="020B0604020202020204" pitchFamily="34" charset="0"/>
+                <a:sym typeface="Wingdings" pitchFamily="2" charset="2"/>
+              </a:rPr>
+              <a:t>fMRI &amp; fNIRS: Secondary joint Activation Likelihood Estimation (n = 22/60) </a:t>
+            </a:r>
+            <a:endParaRPr lang="en-DE" sz="1746" dirty="0">
+              <a:solidFill>
+                <a:schemeClr val="bg2"/>
+              </a:solidFill>
+              <a:latin typeface="Arial" panose="020B0604020202020204" pitchFamily="34" charset="0"/>
+              <a:cs typeface="Arial" panose="020B0604020202020204" pitchFamily="34" charset="0"/>
+            </a:endParaRPr>
+          </a:p>
+        </p:txBody>
+      </p:sp>
+      <p:sp>
+        <p:nvSpPr>
+          <p:cNvPr id="30" name="Rounded Rectangle 29">
+            <a:extLst>
+              <a:ext uri="{FF2B5EF4-FFF2-40B4-BE49-F238E27FC236}">
+                <a16:creationId xmlns:a16="http://schemas.microsoft.com/office/drawing/2014/main" id="{EA363390-4B3D-72E7-0635-C0D791491091}"/>
+              </a:ext>
+            </a:extLst>
+          </p:cNvPr>
+          <p:cNvSpPr/>
+          <p:nvPr/>
+        </p:nvSpPr>
+        <p:spPr>
+          <a:xfrm rot="16200000">
+            <a:off x="724145" y="11739891"/>
+            <a:ext cx="1281923" cy="523427"/>
+          </a:xfrm>
+          <a:prstGeom prst="roundRect">
+            <a:avLst/>
+          </a:prstGeom>
+          <a:noFill/>
+          <a:ln w="63500">
+            <a:solidFill>
+              <a:schemeClr val="accent1">
+                <a:lumMod val="50000"/>
+              </a:schemeClr>
+            </a:solidFill>
+          </a:ln>
+        </p:spPr>
+        <p:style>
+          <a:lnRef idx="2">
+            <a:schemeClr val="accent1">
+              <a:shade val="50000"/>
+            </a:schemeClr>
+          </a:lnRef>
+          <a:fillRef idx="1">
+            <a:schemeClr val="accent1"/>
+          </a:fillRef>
+          <a:effectRef idx="0">
+            <a:schemeClr val="accent1"/>
+          </a:effectRef>
+          <a:fontRef idx="minor">
+            <a:schemeClr val="lt1"/>
+          </a:fontRef>
+        </p:style>
+        <p:txBody>
+          <a:bodyPr rtlCol="0" anchor="ctr"/>
+          <a:lstStyle/>
+          <a:p>
+            <a:pPr algn="ctr"/>
+            <a:r>
+              <a:rPr lang="en-DE" sz="1940" b="1" dirty="0">
+                <a:solidFill>
+                  <a:schemeClr val="accent1">
+                    <a:lumMod val="50000"/>
+                  </a:schemeClr>
+                </a:solidFill>
+                <a:latin typeface="Arial" panose="020B0604020202020204" pitchFamily="34" charset="0"/>
+                <a:cs typeface="Arial" panose="020B0604020202020204" pitchFamily="34" charset="0"/>
+              </a:rPr>
+              <a:t>Analysis</a:t>
+            </a:r>
+            <a:endParaRPr lang="en-DE" sz="1940" b="1" dirty="0">
+              <a:solidFill>
+                <a:schemeClr val="accent1">
+                  <a:lumMod val="50000"/>
+                </a:schemeClr>
+              </a:solidFill>
+              <a:latin typeface="Arial" panose="020B0604020202020204" pitchFamily="34" charset="0"/>
+              <a:cs typeface="Arial" panose="020B0604020202020204" pitchFamily="34" charset="0"/>
+              <a:sym typeface="Wingdings" pitchFamily="2" charset="2"/>
+            </a:endParaRPr>
           </a:p>
         </p:txBody>
       </p:sp>
@@ -5170,4 +5751,299 @@
     </a:ext>
   </a:extLst>
 </a:theme>
+</file>
+
+<file path=ppt/theme/theme2.xml><?xml version="1.0" encoding="utf-8"?>
+<a:theme xmlns:a="http://schemas.openxmlformats.org/drawingml/2006/main" name="Office Theme">
+  <a:themeElements>
+    <a:clrScheme name="Office">
+      <a:dk1>
+        <a:sysClr val="windowText" lastClr="000000"/>
+      </a:dk1>
+      <a:lt1>
+        <a:sysClr val="window" lastClr="FFFFFF"/>
+      </a:lt1>
+      <a:dk2>
+        <a:srgbClr val="44546A"/>
+      </a:dk2>
+      <a:lt2>
+        <a:srgbClr val="E7E6E6"/>
+      </a:lt2>
+      <a:accent1>
+        <a:srgbClr val="4472C4"/>
+      </a:accent1>
+      <a:accent2>
+        <a:srgbClr val="ED7D31"/>
+      </a:accent2>
+      <a:accent3>
+        <a:srgbClr val="A5A5A5"/>
+      </a:accent3>
+      <a:accent4>
+        <a:srgbClr val="FFC000"/>
+      </a:accent4>
+      <a:accent5>
+        <a:srgbClr val="5B9BD5"/>
+      </a:accent5>
+      <a:accent6>
+        <a:srgbClr val="70AD47"/>
+      </a:accent6>
+      <a:hlink>
+        <a:srgbClr val="0563C1"/>
+      </a:hlink>
+      <a:folHlink>
+        <a:srgbClr val="954F72"/>
+      </a:folHlink>
+    </a:clrScheme>
+    <a:fontScheme name="Office">
+      <a:majorFont>
+        <a:latin typeface="Calibri Light" panose="020F0302020204030204"/>
+        <a:ea typeface=""/>
+        <a:cs typeface=""/>
+        <a:font script="Jpan" typeface="游ゴシック Light"/>
+        <a:font script="Hang" typeface="맑은 고딕"/>
+        <a:font script="Hans" typeface="等线 Light"/>
+        <a:font script="Hant" typeface="新細明體"/>
+        <a:font script="Arab" typeface="Times New Roman"/>
+        <a:font script="Hebr" typeface="Times New Roman"/>
+        <a:font script="Thai" typeface="Angsana New"/>
+        <a:font script="Ethi" typeface="Nyala"/>
+        <a:font script="Beng" typeface="Vrinda"/>
+        <a:font script="Gujr" typeface="Shruti"/>
+        <a:font script="Khmr" typeface="MoolBoran"/>
+        <a:font script="Knda" typeface="Tunga"/>
+        <a:font script="Guru" typeface="Raavi"/>
+        <a:font script="Cans" typeface="Euphemia"/>
+        <a:font script="Cher" typeface="Plantagenet Cherokee"/>
+        <a:font script="Yiii" typeface="Microsoft Yi Baiti"/>
+        <a:font script="Tibt" typeface="Microsoft Himalaya"/>
+        <a:font script="Thaa" typeface="MV Boli"/>
+        <a:font script="Deva" typeface="Mangal"/>
+        <a:font script="Telu" typeface="Gautami"/>
+        <a:font script="Taml" typeface="Latha"/>
+        <a:font script="Syrc" typeface="Estrangelo Edessa"/>
+        <a:font script="Orya" typeface="Kalinga"/>
+        <a:font script="Mlym" typeface="Kartika"/>
+        <a:font script="Laoo" typeface="DokChampa"/>
+        <a:font script="Sinh" typeface="Iskoola Pota"/>
+        <a:font script="Mong" typeface="Mongolian Baiti"/>
+        <a:font script="Viet" typeface="Times New Roman"/>
+        <a:font script="Uigh" typeface="Microsoft Uighur"/>
+        <a:font script="Geor" typeface="Sylfaen"/>
+        <a:font script="Armn" typeface="Arial"/>
+        <a:font script="Bugi" typeface="Leelawadee UI"/>
+        <a:font script="Bopo" typeface="Microsoft JhengHei"/>
+        <a:font script="Java" typeface="Javanese Text"/>
+        <a:font script="Lisu" typeface="Segoe UI"/>
+        <a:font script="Mymr" typeface="Myanmar Text"/>
+        <a:font script="Nkoo" typeface="Ebrima"/>
+        <a:font script="Olck" typeface="Nirmala UI"/>
+        <a:font script="Osma" typeface="Ebrima"/>
+        <a:font script="Phag" typeface="Phagspa"/>
+        <a:font script="Syrn" typeface="Estrangelo Edessa"/>
+        <a:font script="Syrj" typeface="Estrangelo Edessa"/>
+        <a:font script="Syre" typeface="Estrangelo Edessa"/>
+        <a:font script="Sora" typeface="Nirmala UI"/>
+        <a:font script="Tale" typeface="Microsoft Tai Le"/>
+        <a:font script="Talu" typeface="Microsoft New Tai Lue"/>
+        <a:font script="Tfng" typeface="Ebrima"/>
+      </a:majorFont>
+      <a:minorFont>
+        <a:latin typeface="Calibri" panose="020F0502020204030204"/>
+        <a:ea typeface=""/>
+        <a:cs typeface=""/>
+        <a:font script="Jpan" typeface="游ゴシック"/>
+        <a:font script="Hang" typeface="맑은 고딕"/>
+        <a:font script="Hans" typeface="等线"/>
+        <a:font script="Hant" typeface="新細明體"/>
+        <a:font script="Arab" typeface="Arial"/>
+        <a:font script="Hebr" typeface="Arial"/>
+        <a:font script="Thai" typeface="Cordia New"/>
+        <a:font script="Ethi" typeface="Nyala"/>
+        <a:font script="Beng" typeface="Vrinda"/>
+        <a:font script="Gujr" typeface="Shruti"/>
+        <a:font script="Khmr" typeface="DaunPenh"/>
+        <a:font script="Knda" typeface="Tunga"/>
+        <a:font script="Guru" typeface="Raavi"/>
+        <a:font script="Cans" typeface="Euphemia"/>
+        <a:font script="Cher" typeface="Plantagenet Cherokee"/>
+        <a:font script="Yiii" typeface="Microsoft Yi Baiti"/>
+        <a:font script="Tibt" typeface="Microsoft Himalaya"/>
+        <a:font script="Thaa" typeface="MV Boli"/>
+        <a:font script="Deva" typeface="Mangal"/>
+        <a:font script="Telu" typeface="Gautami"/>
+        <a:font script="Taml" typeface="Latha"/>
+        <a:font script="Syrc" typeface="Estrangelo Edessa"/>
+        <a:font script="Orya" typeface="Kalinga"/>
+        <a:font script="Mlym" typeface="Kartika"/>
+        <a:font script="Laoo" typeface="DokChampa"/>
+        <a:font script="Sinh" typeface="Iskoola Pota"/>
+        <a:font script="Mong" typeface="Mongolian Baiti"/>
+        <a:font script="Viet" typeface="Arial"/>
+        <a:font script="Uigh" typeface="Microsoft Uighur"/>
+        <a:font script="Geor" typeface="Sylfaen"/>
+        <a:font script="Armn" typeface="Arial"/>
+        <a:font script="Bugi" typeface="Leelawadee UI"/>
+        <a:font script="Bopo" typeface="Microsoft JhengHei"/>
+        <a:font script="Java" typeface="Javanese Text"/>
+        <a:font script="Lisu" typeface="Segoe UI"/>
+        <a:font script="Mymr" typeface="Myanmar Text"/>
+        <a:font script="Nkoo" typeface="Ebrima"/>
+        <a:font script="Olck" typeface="Nirmala UI"/>
+        <a:font script="Osma" typeface="Ebrima"/>
+        <a:font script="Phag" typeface="Phagspa"/>
+        <a:font script="Syrn" typeface="Estrangelo Edessa"/>
+        <a:font script="Syrj" typeface="Estrangelo Edessa"/>
+        <a:font script="Syre" typeface="Estrangelo Edessa"/>
+        <a:font script="Sora" typeface="Nirmala UI"/>
+        <a:font script="Tale" typeface="Microsoft Tai Le"/>
+        <a:font script="Talu" typeface="Microsoft New Tai Lue"/>
+        <a:font script="Tfng" typeface="Ebrima"/>
+      </a:minorFont>
+    </a:fontScheme>
+    <a:fmtScheme name="Office">
+      <a:fillStyleLst>
+        <a:solidFill>
+          <a:schemeClr val="phClr"/>
+        </a:solidFill>
+        <a:gradFill rotWithShape="1">
+          <a:gsLst>
+            <a:gs pos="0">
+              <a:schemeClr val="phClr">
+                <a:lumMod val="110000"/>
+                <a:satMod val="105000"/>
+                <a:tint val="67000"/>
+              </a:schemeClr>
+            </a:gs>
+            <a:gs pos="50000">
+              <a:schemeClr val="phClr">
+                <a:lumMod val="105000"/>
+                <a:satMod val="103000"/>
+                <a:tint val="73000"/>
+              </a:schemeClr>
+            </a:gs>
+            <a:gs pos="100000">
+              <a:schemeClr val="phClr">
+                <a:lumMod val="105000"/>
+                <a:satMod val="109000"/>
+                <a:tint val="81000"/>
+              </a:schemeClr>
+            </a:gs>
+          </a:gsLst>
+          <a:lin ang="5400000" scaled="0"/>
+        </a:gradFill>
+        <a:gradFill rotWithShape="1">
+          <a:gsLst>
+            <a:gs pos="0">
+              <a:schemeClr val="phClr">
+                <a:satMod val="103000"/>
+                <a:lumMod val="102000"/>
+                <a:tint val="94000"/>
+              </a:schemeClr>
+            </a:gs>
+            <a:gs pos="50000">
+              <a:schemeClr val="phClr">
+                <a:satMod val="110000"/>
+                <a:lumMod val="100000"/>
+                <a:shade val="100000"/>
+              </a:schemeClr>
+            </a:gs>
+            <a:gs pos="100000">
+              <a:schemeClr val="phClr">
+                <a:lumMod val="99000"/>
+                <a:satMod val="120000"/>
+                <a:shade val="78000"/>
+              </a:schemeClr>
+            </a:gs>
+          </a:gsLst>
+          <a:lin ang="5400000" scaled="0"/>
+        </a:gradFill>
+      </a:fillStyleLst>
+      <a:lnStyleLst>
+        <a:ln w="6350" cap="flat" cmpd="sng" algn="ctr">
+          <a:solidFill>
+            <a:schemeClr val="phClr"/>
+          </a:solidFill>
+          <a:prstDash val="solid"/>
+          <a:miter lim="800000"/>
+        </a:ln>
+        <a:ln w="12700" cap="flat" cmpd="sng" algn="ctr">
+          <a:solidFill>
+            <a:schemeClr val="phClr"/>
+          </a:solidFill>
+          <a:prstDash val="solid"/>
+          <a:miter lim="800000"/>
+        </a:ln>
+        <a:ln w="19050" cap="flat" cmpd="sng" algn="ctr">
+          <a:solidFill>
+            <a:schemeClr val="phClr"/>
+          </a:solidFill>
+          <a:prstDash val="solid"/>
+          <a:miter lim="800000"/>
+        </a:ln>
+      </a:lnStyleLst>
+      <a:effectStyleLst>
+        <a:effectStyle>
+          <a:effectLst/>
+        </a:effectStyle>
+        <a:effectStyle>
+          <a:effectLst/>
+        </a:effectStyle>
+        <a:effectStyle>
+          <a:effectLst>
+            <a:outerShdw blurRad="57150" dist="19050" dir="5400000" algn="ctr" rotWithShape="0">
+              <a:srgbClr val="000000">
+                <a:alpha val="63000"/>
+              </a:srgbClr>
+            </a:outerShdw>
+          </a:effectLst>
+        </a:effectStyle>
+      </a:effectStyleLst>
+      <a:bgFillStyleLst>
+        <a:solidFill>
+          <a:schemeClr val="phClr"/>
+        </a:solidFill>
+        <a:solidFill>
+          <a:schemeClr val="phClr">
+            <a:tint val="95000"/>
+            <a:satMod val="170000"/>
+          </a:schemeClr>
+        </a:solidFill>
+        <a:gradFill rotWithShape="1">
+          <a:gsLst>
+            <a:gs pos="0">
+              <a:schemeClr val="phClr">
+                <a:tint val="93000"/>
+                <a:satMod val="150000"/>
+                <a:shade val="98000"/>
+                <a:lumMod val="102000"/>
+              </a:schemeClr>
+            </a:gs>
+            <a:gs pos="50000">
+              <a:schemeClr val="phClr">
+                <a:tint val="98000"/>
+                <a:satMod val="130000"/>
+                <a:shade val="90000"/>
+                <a:lumMod val="103000"/>
+              </a:schemeClr>
+            </a:gs>
+            <a:gs pos="100000">
+              <a:schemeClr val="phClr">
+                <a:shade val="63000"/>
+                <a:satMod val="120000"/>
+              </a:schemeClr>
+            </a:gs>
+          </a:gsLst>
+          <a:lin ang="5400000" scaled="0"/>
+        </a:gradFill>
+      </a:bgFillStyleLst>
+    </a:fmtScheme>
+  </a:themeElements>
+  <a:objectDefaults/>
+  <a:extraClrSchemeLst/>
+  <a:extLst>
+    <a:ext uri="{05A4C25C-085E-4340-85A3-A5531E510DB2}">
+      <thm15:themeFamily xmlns:thm15="http://schemas.microsoft.com/office/thememl/2012/main" name="Office Theme" id="{62F939B6-93AF-4DB8-9C6B-D6C7DFDC589F}" vid="{4A3C46E8-61CC-4603-A589-7422A47A8E4A}"/>
+    </a:ext>
+  </a:extLst>
+</a:theme>
 </file>
</xml_diff>